<commit_message>
chore: atualização do escopo da apresentação
</commit_message>
<xml_diff>
--- a/Bootcamp - apresentação.pptx
+++ b/Bootcamp - apresentação.pptx
@@ -5,7 +5,7 @@
     <p:sldMasterId id="2147483648" r:id="rId1"/>
   </p:sldMasterIdLst>
   <p:notesMasterIdLst>
-    <p:notesMasterId r:id="rId31"/>
+    <p:notesMasterId r:id="rId28"/>
   </p:notesMasterIdLst>
   <p:sldIdLst>
     <p:sldId id="257" r:id="rId2"/>
@@ -28,15 +28,12 @@
     <p:sldId id="283" r:id="rId19"/>
     <p:sldId id="286" r:id="rId20"/>
     <p:sldId id="287" r:id="rId21"/>
-    <p:sldId id="288" r:id="rId22"/>
-    <p:sldId id="406" r:id="rId23"/>
-    <p:sldId id="289" r:id="rId24"/>
-    <p:sldId id="290" r:id="rId25"/>
-    <p:sldId id="292" r:id="rId26"/>
-    <p:sldId id="296" r:id="rId27"/>
-    <p:sldId id="297" r:id="rId28"/>
-    <p:sldId id="291" r:id="rId29"/>
-    <p:sldId id="294" r:id="rId30"/>
+    <p:sldId id="289" r:id="rId22"/>
+    <p:sldId id="290" r:id="rId23"/>
+    <p:sldId id="292" r:id="rId24"/>
+    <p:sldId id="296" r:id="rId25"/>
+    <p:sldId id="291" r:id="rId26"/>
+    <p:sldId id="294" r:id="rId27"/>
   </p:sldIdLst>
   <p:sldSz cx="12192000" cy="6858000"/>
   <p:notesSz cx="6858000" cy="9144000"/>
@@ -17844,2761 +17841,6 @@
   <p:cSld>
     <p:spTree>
       <p:nvGrpSpPr>
-        <p:cNvPr id="1" name=""/>
-        <p:cNvGrpSpPr/>
-        <p:nvPr/>
-      </p:nvGrpSpPr>
-      <p:grpSpPr>
-        <a:xfrm>
-          <a:off x="0" y="0"/>
-          <a:ext cx="0" cy="0"/>
-          <a:chOff x="0" y="0"/>
-          <a:chExt cx="0" cy="0"/>
-        </a:xfrm>
-      </p:grpSpPr>
-      <p:sp>
-        <p:nvSpPr>
-          <p:cNvPr id="18" name="Google Shape;76;p15">
-            <a:extLst>
-              <a:ext uri="{FF2B5EF4-FFF2-40B4-BE49-F238E27FC236}">
-                <a16:creationId xmlns:a16="http://schemas.microsoft.com/office/drawing/2014/main" id="{DB4AF350-8639-954F-B271-867C9C6E7F23}"/>
-              </a:ext>
-            </a:extLst>
-          </p:cNvPr>
-          <p:cNvSpPr txBox="1">
-            <a:spLocks/>
-          </p:cNvSpPr>
-          <p:nvPr/>
-        </p:nvSpPr>
-        <p:spPr>
-          <a:xfrm>
-            <a:off x="472369" y="1758261"/>
-            <a:ext cx="3217364" cy="1386604"/>
-          </a:xfrm>
-          <a:prstGeom prst="rect">
-            <a:avLst/>
-          </a:prstGeom>
-          <a:noFill/>
-          <a:ln>
-            <a:noFill/>
-          </a:ln>
-        </p:spPr>
-        <p:txBody>
-          <a:bodyPr spcFirstLastPara="1" wrap="square" lIns="121900" tIns="121900" rIns="121900" bIns="121900" anchor="t" anchorCtr="0">
-            <a:noAutofit/>
-          </a:bodyPr>
-          <a:lstStyle>
-            <a:defPPr marR="0" lvl="0" algn="l" rtl="0">
-              <a:lnSpc>
-                <a:spcPct val="100000"/>
-              </a:lnSpc>
-              <a:spcBef>
-                <a:spcPts val="0"/>
-              </a:spcBef>
-              <a:spcAft>
-                <a:spcPts val="0"/>
-              </a:spcAft>
-            </a:defPPr>
-            <a:lvl1pPr marL="457200" marR="0" lvl="0" indent="-342900" algn="ctr" rtl="0">
-              <a:lnSpc>
-                <a:spcPct val="100000"/>
-              </a:lnSpc>
-              <a:spcBef>
-                <a:spcPts val="0"/>
-              </a:spcBef>
-              <a:spcAft>
-                <a:spcPts val="0"/>
-              </a:spcAft>
-              <a:buClr>
-                <a:schemeClr val="dk2"/>
-              </a:buClr>
-              <a:buSzPts val="2800"/>
-              <a:buFont typeface="Arial"/>
-              <a:buNone/>
-              <a:defRPr sz="2800" b="0" i="0" u="none" strike="noStrike" cap="none">
-                <a:solidFill>
-                  <a:schemeClr val="dk2"/>
-                </a:solidFill>
-                <a:latin typeface="Arial"/>
-                <a:ea typeface="Arial"/>
-                <a:cs typeface="Arial"/>
-                <a:sym typeface="Arial"/>
-              </a:defRPr>
-            </a:lvl1pPr>
-            <a:lvl2pPr marL="914400" marR="0" lvl="1" indent="-317500" algn="ctr" rtl="0">
-              <a:lnSpc>
-                <a:spcPct val="100000"/>
-              </a:lnSpc>
-              <a:spcBef>
-                <a:spcPts val="0"/>
-              </a:spcBef>
-              <a:spcAft>
-                <a:spcPts val="0"/>
-              </a:spcAft>
-              <a:buClr>
-                <a:schemeClr val="dk2"/>
-              </a:buClr>
-              <a:buSzPts val="2800"/>
-              <a:buFont typeface="Arial"/>
-              <a:buNone/>
-              <a:defRPr sz="2800" b="0" i="0" u="none" strike="noStrike" cap="none">
-                <a:solidFill>
-                  <a:schemeClr val="dk2"/>
-                </a:solidFill>
-                <a:latin typeface="Arial"/>
-                <a:ea typeface="Arial"/>
-                <a:cs typeface="Arial"/>
-                <a:sym typeface="Arial"/>
-              </a:defRPr>
-            </a:lvl2pPr>
-            <a:lvl3pPr marL="1371600" marR="0" lvl="2" indent="-317500" algn="ctr" rtl="0">
-              <a:lnSpc>
-                <a:spcPct val="100000"/>
-              </a:lnSpc>
-              <a:spcBef>
-                <a:spcPts val="0"/>
-              </a:spcBef>
-              <a:spcAft>
-                <a:spcPts val="0"/>
-              </a:spcAft>
-              <a:buClr>
-                <a:schemeClr val="dk2"/>
-              </a:buClr>
-              <a:buSzPts val="2800"/>
-              <a:buFont typeface="Arial"/>
-              <a:buNone/>
-              <a:defRPr sz="2800" b="0" i="0" u="none" strike="noStrike" cap="none">
-                <a:solidFill>
-                  <a:schemeClr val="dk2"/>
-                </a:solidFill>
-                <a:latin typeface="Arial"/>
-                <a:ea typeface="Arial"/>
-                <a:cs typeface="Arial"/>
-                <a:sym typeface="Arial"/>
-              </a:defRPr>
-            </a:lvl3pPr>
-            <a:lvl4pPr marL="1828800" marR="0" lvl="3" indent="-317500" algn="ctr" rtl="0">
-              <a:lnSpc>
-                <a:spcPct val="100000"/>
-              </a:lnSpc>
-              <a:spcBef>
-                <a:spcPts val="0"/>
-              </a:spcBef>
-              <a:spcAft>
-                <a:spcPts val="0"/>
-              </a:spcAft>
-              <a:buClr>
-                <a:schemeClr val="dk2"/>
-              </a:buClr>
-              <a:buSzPts val="2800"/>
-              <a:buFont typeface="Arial"/>
-              <a:buNone/>
-              <a:defRPr sz="2800" b="0" i="0" u="none" strike="noStrike" cap="none">
-                <a:solidFill>
-                  <a:schemeClr val="dk2"/>
-                </a:solidFill>
-                <a:latin typeface="Arial"/>
-                <a:ea typeface="Arial"/>
-                <a:cs typeface="Arial"/>
-                <a:sym typeface="Arial"/>
-              </a:defRPr>
-            </a:lvl4pPr>
-            <a:lvl5pPr marL="2286000" marR="0" lvl="4" indent="-317500" algn="ctr" rtl="0">
-              <a:lnSpc>
-                <a:spcPct val="100000"/>
-              </a:lnSpc>
-              <a:spcBef>
-                <a:spcPts val="0"/>
-              </a:spcBef>
-              <a:spcAft>
-                <a:spcPts val="0"/>
-              </a:spcAft>
-              <a:buClr>
-                <a:schemeClr val="dk2"/>
-              </a:buClr>
-              <a:buSzPts val="2800"/>
-              <a:buFont typeface="Arial"/>
-              <a:buNone/>
-              <a:defRPr sz="2800" b="0" i="0" u="none" strike="noStrike" cap="none">
-                <a:solidFill>
-                  <a:schemeClr val="dk2"/>
-                </a:solidFill>
-                <a:latin typeface="Arial"/>
-                <a:ea typeface="Arial"/>
-                <a:cs typeface="Arial"/>
-                <a:sym typeface="Arial"/>
-              </a:defRPr>
-            </a:lvl5pPr>
-            <a:lvl6pPr marL="2743200" marR="0" lvl="5" indent="-317500" algn="ctr" rtl="0">
-              <a:lnSpc>
-                <a:spcPct val="100000"/>
-              </a:lnSpc>
-              <a:spcBef>
-                <a:spcPts val="0"/>
-              </a:spcBef>
-              <a:spcAft>
-                <a:spcPts val="0"/>
-              </a:spcAft>
-              <a:buClr>
-                <a:schemeClr val="dk2"/>
-              </a:buClr>
-              <a:buSzPts val="2800"/>
-              <a:buFont typeface="Arial"/>
-              <a:buNone/>
-              <a:defRPr sz="2800" b="0" i="0" u="none" strike="noStrike" cap="none">
-                <a:solidFill>
-                  <a:schemeClr val="dk2"/>
-                </a:solidFill>
-                <a:latin typeface="Arial"/>
-                <a:ea typeface="Arial"/>
-                <a:cs typeface="Arial"/>
-                <a:sym typeface="Arial"/>
-              </a:defRPr>
-            </a:lvl6pPr>
-            <a:lvl7pPr marL="3200400" marR="0" lvl="6" indent="-317500" algn="ctr" rtl="0">
-              <a:lnSpc>
-                <a:spcPct val="100000"/>
-              </a:lnSpc>
-              <a:spcBef>
-                <a:spcPts val="0"/>
-              </a:spcBef>
-              <a:spcAft>
-                <a:spcPts val="0"/>
-              </a:spcAft>
-              <a:buClr>
-                <a:schemeClr val="dk2"/>
-              </a:buClr>
-              <a:buSzPts val="2800"/>
-              <a:buFont typeface="Arial"/>
-              <a:buNone/>
-              <a:defRPr sz="2800" b="0" i="0" u="none" strike="noStrike" cap="none">
-                <a:solidFill>
-                  <a:schemeClr val="dk2"/>
-                </a:solidFill>
-                <a:latin typeface="Arial"/>
-                <a:ea typeface="Arial"/>
-                <a:cs typeface="Arial"/>
-                <a:sym typeface="Arial"/>
-              </a:defRPr>
-            </a:lvl7pPr>
-            <a:lvl8pPr marL="3657600" marR="0" lvl="7" indent="-317500" algn="ctr" rtl="0">
-              <a:lnSpc>
-                <a:spcPct val="100000"/>
-              </a:lnSpc>
-              <a:spcBef>
-                <a:spcPts val="0"/>
-              </a:spcBef>
-              <a:spcAft>
-                <a:spcPts val="0"/>
-              </a:spcAft>
-              <a:buClr>
-                <a:schemeClr val="dk2"/>
-              </a:buClr>
-              <a:buSzPts val="2800"/>
-              <a:buFont typeface="Arial"/>
-              <a:buNone/>
-              <a:defRPr sz="2800" b="0" i="0" u="none" strike="noStrike" cap="none">
-                <a:solidFill>
-                  <a:schemeClr val="dk2"/>
-                </a:solidFill>
-                <a:latin typeface="Arial"/>
-                <a:ea typeface="Arial"/>
-                <a:cs typeface="Arial"/>
-                <a:sym typeface="Arial"/>
-              </a:defRPr>
-            </a:lvl8pPr>
-            <a:lvl9pPr marL="4114800" marR="0" lvl="8" indent="-317500" algn="ctr" rtl="0">
-              <a:lnSpc>
-                <a:spcPct val="100000"/>
-              </a:lnSpc>
-              <a:spcBef>
-                <a:spcPts val="0"/>
-              </a:spcBef>
-              <a:spcAft>
-                <a:spcPts val="0"/>
-              </a:spcAft>
-              <a:buClr>
-                <a:schemeClr val="dk2"/>
-              </a:buClr>
-              <a:buSzPts val="2800"/>
-              <a:buFont typeface="Arial"/>
-              <a:buNone/>
-              <a:defRPr sz="2800" b="0" i="0" u="none" strike="noStrike" cap="none">
-                <a:solidFill>
-                  <a:schemeClr val="dk2"/>
-                </a:solidFill>
-                <a:latin typeface="Arial"/>
-                <a:ea typeface="Arial"/>
-                <a:cs typeface="Arial"/>
-                <a:sym typeface="Arial"/>
-              </a:defRPr>
-            </a:lvl9pPr>
-          </a:lstStyle>
-          <a:p>
-            <a:pPr marL="673086" indent="-457200" algn="l">
-              <a:lnSpc>
-                <a:spcPct val="150000"/>
-              </a:lnSpc>
-              <a:buClr>
-                <a:srgbClr val="073763"/>
-              </a:buClr>
-              <a:buSzPts val="2400"/>
-              <a:buFont typeface="Arial" panose="020B0604020202020204" pitchFamily="34" charset="0"/>
-              <a:buChar char="•"/>
-            </a:pPr>
-            <a:r>
-              <a:rPr lang="pt-BR" sz="2400" dirty="0" err="1">
-                <a:solidFill>
-                  <a:srgbClr val="073763"/>
-                </a:solidFill>
-                <a:latin typeface="Century Gothic" panose="020B0502020202020204" pitchFamily="34" charset="0"/>
-                <a:sym typeface="Proxima Nova"/>
-              </a:rPr>
-              <a:t>Stateful</a:t>
-            </a:r>
-            <a:endParaRPr lang="pt-BR" sz="2400" dirty="0">
-              <a:solidFill>
-                <a:srgbClr val="073763"/>
-              </a:solidFill>
-              <a:latin typeface="Century Gothic" panose="020B0502020202020204" pitchFamily="34" charset="0"/>
-              <a:sym typeface="Proxima Nova"/>
-            </a:endParaRPr>
-          </a:p>
-          <a:p>
-            <a:pPr marL="673086" indent="-457200" algn="l">
-              <a:lnSpc>
-                <a:spcPct val="150000"/>
-              </a:lnSpc>
-              <a:buClr>
-                <a:srgbClr val="073763"/>
-              </a:buClr>
-              <a:buSzPts val="2400"/>
-              <a:buFont typeface="Arial" panose="020B0604020202020204" pitchFamily="34" charset="0"/>
-              <a:buChar char="•"/>
-            </a:pPr>
-            <a:r>
-              <a:rPr lang="pt-BR" sz="2400" dirty="0">
-                <a:solidFill>
-                  <a:srgbClr val="073763"/>
-                </a:solidFill>
-                <a:latin typeface="Century Gothic" panose="020B0502020202020204" pitchFamily="34" charset="0"/>
-                <a:sym typeface="Proxima Nova"/>
-              </a:rPr>
-              <a:t>Broadcast</a:t>
-            </a:r>
-          </a:p>
-          <a:p>
-            <a:pPr marL="673086" indent="-457200" algn="l">
-              <a:buClr>
-                <a:srgbClr val="073763"/>
-              </a:buClr>
-              <a:buSzPts val="2400"/>
-              <a:buFont typeface="Arial" panose="020B0604020202020204" pitchFamily="34" charset="0"/>
-              <a:buChar char="•"/>
-            </a:pPr>
-            <a:endParaRPr lang="en-US" sz="2400" dirty="0">
-              <a:solidFill>
-                <a:srgbClr val="073763"/>
-              </a:solidFill>
-              <a:latin typeface="Century Gothic" panose="020B0502020202020204" pitchFamily="34" charset="0"/>
-              <a:sym typeface="Proxima Nova"/>
-            </a:endParaRPr>
-          </a:p>
-        </p:txBody>
-      </p:sp>
-      <p:sp>
-        <p:nvSpPr>
-          <p:cNvPr id="25" name="Retângulo Arredondado 24">
-            <a:extLst>
-              <a:ext uri="{FF2B5EF4-FFF2-40B4-BE49-F238E27FC236}">
-                <a16:creationId xmlns:a16="http://schemas.microsoft.com/office/drawing/2014/main" id="{507A6480-6804-A343-A9BF-B5342A1F7BEF}"/>
-              </a:ext>
-            </a:extLst>
-          </p:cNvPr>
-          <p:cNvSpPr/>
-          <p:nvPr/>
-        </p:nvSpPr>
-        <p:spPr>
-          <a:xfrm>
-            <a:off x="6320350" y="3528790"/>
-            <a:ext cx="1803117" cy="568270"/>
-          </a:xfrm>
-          <a:prstGeom prst="roundRect">
-            <a:avLst/>
-          </a:prstGeom>
-          <a:solidFill>
-            <a:schemeClr val="accent1">
-              <a:lumMod val="40000"/>
-              <a:lumOff val="60000"/>
-            </a:schemeClr>
-          </a:solidFill>
-        </p:spPr>
-        <p:style>
-          <a:lnRef idx="2">
-            <a:schemeClr val="accent1">
-              <a:shade val="50000"/>
-            </a:schemeClr>
-          </a:lnRef>
-          <a:fillRef idx="1">
-            <a:schemeClr val="accent1"/>
-          </a:fillRef>
-          <a:effectRef idx="0">
-            <a:schemeClr val="accent1"/>
-          </a:effectRef>
-          <a:fontRef idx="minor">
-            <a:schemeClr val="lt1"/>
-          </a:fontRef>
-        </p:style>
-        <p:txBody>
-          <a:bodyPr rtlCol="0" anchor="ctr"/>
-          <a:lstStyle/>
-          <a:p>
-            <a:pPr algn="ctr"/>
-            <a:r>
-              <a:rPr lang="pt-BR" sz="1200" dirty="0">
-                <a:solidFill>
-                  <a:schemeClr val="tx1"/>
-                </a:solidFill>
-              </a:rPr>
-              <a:t>Componente Pai</a:t>
-            </a:r>
-          </a:p>
-        </p:txBody>
-      </p:sp>
-      <p:sp>
-        <p:nvSpPr>
-          <p:cNvPr id="26" name="Retângulo Arredondado 25">
-            <a:extLst>
-              <a:ext uri="{FF2B5EF4-FFF2-40B4-BE49-F238E27FC236}">
-                <a16:creationId xmlns:a16="http://schemas.microsoft.com/office/drawing/2014/main" id="{1A02F826-DF24-D748-B859-87CE78F4828D}"/>
-              </a:ext>
-            </a:extLst>
-          </p:cNvPr>
-          <p:cNvSpPr/>
-          <p:nvPr/>
-        </p:nvSpPr>
-        <p:spPr>
-          <a:xfrm>
-            <a:off x="8318160" y="4504267"/>
-            <a:ext cx="1803117" cy="568270"/>
-          </a:xfrm>
-          <a:prstGeom prst="roundRect">
-            <a:avLst/>
-          </a:prstGeom>
-          <a:solidFill>
-            <a:schemeClr val="accent1">
-              <a:lumMod val="40000"/>
-              <a:lumOff val="60000"/>
-            </a:schemeClr>
-          </a:solidFill>
-        </p:spPr>
-        <p:style>
-          <a:lnRef idx="2">
-            <a:schemeClr val="accent1">
-              <a:shade val="50000"/>
-            </a:schemeClr>
-          </a:lnRef>
-          <a:fillRef idx="1">
-            <a:schemeClr val="accent1"/>
-          </a:fillRef>
-          <a:effectRef idx="0">
-            <a:schemeClr val="accent1"/>
-          </a:effectRef>
-          <a:fontRef idx="minor">
-            <a:schemeClr val="lt1"/>
-          </a:fontRef>
-        </p:style>
-        <p:txBody>
-          <a:bodyPr rtlCol="0" anchor="ctr"/>
-          <a:lstStyle/>
-          <a:p>
-            <a:pPr algn="ctr"/>
-            <a:r>
-              <a:rPr lang="pt-BR" sz="1200" dirty="0">
-                <a:solidFill>
-                  <a:schemeClr val="tx1"/>
-                </a:solidFill>
-              </a:rPr>
-              <a:t>Componente Filho 2</a:t>
-            </a:r>
-          </a:p>
-        </p:txBody>
-      </p:sp>
-      <p:sp>
-        <p:nvSpPr>
-          <p:cNvPr id="30" name="Retângulo Arredondado 29">
-            <a:extLst>
-              <a:ext uri="{FF2B5EF4-FFF2-40B4-BE49-F238E27FC236}">
-                <a16:creationId xmlns:a16="http://schemas.microsoft.com/office/drawing/2014/main" id="{E3E58AED-2F3F-8F48-BE4A-C3A6C99F1BC1}"/>
-              </a:ext>
-            </a:extLst>
-          </p:cNvPr>
-          <p:cNvSpPr/>
-          <p:nvPr/>
-        </p:nvSpPr>
-        <p:spPr>
-          <a:xfrm>
-            <a:off x="5418792" y="4504267"/>
-            <a:ext cx="1803117" cy="568270"/>
-          </a:xfrm>
-          <a:prstGeom prst="roundRect">
-            <a:avLst/>
-          </a:prstGeom>
-          <a:solidFill>
-            <a:schemeClr val="accent1">
-              <a:lumMod val="40000"/>
-              <a:lumOff val="60000"/>
-            </a:schemeClr>
-          </a:solidFill>
-        </p:spPr>
-        <p:style>
-          <a:lnRef idx="2">
-            <a:schemeClr val="accent1">
-              <a:shade val="50000"/>
-            </a:schemeClr>
-          </a:lnRef>
-          <a:fillRef idx="1">
-            <a:schemeClr val="accent1"/>
-          </a:fillRef>
-          <a:effectRef idx="0">
-            <a:schemeClr val="accent1"/>
-          </a:effectRef>
-          <a:fontRef idx="minor">
-            <a:schemeClr val="lt1"/>
-          </a:fontRef>
-        </p:style>
-        <p:txBody>
-          <a:bodyPr rtlCol="0" anchor="ctr"/>
-          <a:lstStyle/>
-          <a:p>
-            <a:pPr algn="ctr"/>
-            <a:r>
-              <a:rPr lang="pt-BR" sz="1200" dirty="0">
-                <a:solidFill>
-                  <a:schemeClr val="tx1"/>
-                </a:solidFill>
-              </a:rPr>
-              <a:t>Componente Filho 1</a:t>
-            </a:r>
-          </a:p>
-        </p:txBody>
-      </p:sp>
-      <p:pic>
-        <p:nvPicPr>
-          <p:cNvPr id="45" name="Gráfico 44" descr="Seta curva no sentido horário">
-            <a:extLst>
-              <a:ext uri="{FF2B5EF4-FFF2-40B4-BE49-F238E27FC236}">
-                <a16:creationId xmlns:a16="http://schemas.microsoft.com/office/drawing/2014/main" id="{7B3FC9DB-BBD4-D947-9B5C-A36FCB29EEF2}"/>
-              </a:ext>
-            </a:extLst>
-          </p:cNvPr>
-          <p:cNvPicPr>
-            <a:picLocks noChangeAspect="1"/>
-          </p:cNvPicPr>
-          <p:nvPr/>
-        </p:nvPicPr>
-        <p:blipFill>
-          <a:blip r:embed="rId2">
-            <a:extLst>
-              <a:ext uri="{96DAC541-7B7A-43D3-8B79-37D633B846F1}">
-                <asvg:svgBlip xmlns:asvg="http://schemas.microsoft.com/office/drawing/2016/SVG/main" r:embed="rId3"/>
-              </a:ext>
-            </a:extLst>
-          </a:blip>
-          <a:stretch>
-            <a:fillRect/>
-          </a:stretch>
-        </p:blipFill>
-        <p:spPr>
-          <a:xfrm>
-            <a:off x="4322541" y="3429000"/>
-            <a:ext cx="1170309" cy="1669044"/>
-          </a:xfrm>
-          <a:prstGeom prst="rect">
-            <a:avLst/>
-          </a:prstGeom>
-        </p:spPr>
-      </p:pic>
-      <p:grpSp>
-        <p:nvGrpSpPr>
-          <p:cNvPr id="67" name="Agrupar 66">
-            <a:extLst>
-              <a:ext uri="{FF2B5EF4-FFF2-40B4-BE49-F238E27FC236}">
-                <a16:creationId xmlns:a16="http://schemas.microsoft.com/office/drawing/2014/main" id="{2165C241-6D73-1C45-B597-78B595BA0E41}"/>
-              </a:ext>
-            </a:extLst>
-          </p:cNvPr>
-          <p:cNvGrpSpPr/>
-          <p:nvPr/>
-        </p:nvGrpSpPr>
-        <p:grpSpPr>
-          <a:xfrm>
-            <a:off x="6241556" y="2850071"/>
-            <a:ext cx="3465826" cy="1545714"/>
-            <a:chOff x="6241556" y="2850071"/>
-            <a:chExt cx="3465826" cy="1545714"/>
-          </a:xfrm>
-        </p:grpSpPr>
-        <p:grpSp>
-          <p:nvGrpSpPr>
-            <p:cNvPr id="65" name="Agrupar 64">
-              <a:extLst>
-                <a:ext uri="{FF2B5EF4-FFF2-40B4-BE49-F238E27FC236}">
-                  <a16:creationId xmlns:a16="http://schemas.microsoft.com/office/drawing/2014/main" id="{08389A23-C4E2-E845-8A73-16AB17B30E52}"/>
-                </a:ext>
-              </a:extLst>
-            </p:cNvPr>
-            <p:cNvGrpSpPr/>
-            <p:nvPr/>
-          </p:nvGrpSpPr>
-          <p:grpSpPr>
-            <a:xfrm>
-              <a:off x="6241556" y="2850071"/>
-              <a:ext cx="3352861" cy="1038309"/>
-              <a:chOff x="6241556" y="2850071"/>
-              <a:chExt cx="3352861" cy="1038309"/>
-            </a:xfrm>
-          </p:grpSpPr>
-          <p:pic>
-            <p:nvPicPr>
-              <p:cNvPr id="53" name="Gráfico 52" descr="Seta curva no sentido horário">
-                <a:extLst>
-                  <a:ext uri="{FF2B5EF4-FFF2-40B4-BE49-F238E27FC236}">
-                    <a16:creationId xmlns:a16="http://schemas.microsoft.com/office/drawing/2014/main" id="{8E248E63-99D5-0E4A-AED3-14A62E0BAD90}"/>
-                  </a:ext>
-                </a:extLst>
-              </p:cNvPr>
-              <p:cNvPicPr>
-                <a:picLocks noChangeAspect="1"/>
-              </p:cNvPicPr>
-              <p:nvPr/>
-            </p:nvPicPr>
-            <p:blipFill>
-              <a:blip r:embed="rId4">
-                <a:extLst>
-                  <a:ext uri="{96DAC541-7B7A-43D3-8B79-37D633B846F1}">
-                    <asvg:svgBlip xmlns:asvg="http://schemas.microsoft.com/office/drawing/2016/SVG/main" r:embed="rId5"/>
-                  </a:ext>
-                </a:extLst>
-              </a:blip>
-              <a:stretch>
-                <a:fillRect/>
-              </a:stretch>
-            </p:blipFill>
-            <p:spPr>
-              <a:xfrm rot="9812755">
-                <a:off x="6241556" y="2850071"/>
-                <a:ext cx="905052" cy="712034"/>
-              </a:xfrm>
-              <a:prstGeom prst="rect">
-                <a:avLst/>
-              </a:prstGeom>
-            </p:spPr>
-          </p:pic>
-          <p:sp>
-            <p:nvSpPr>
-              <p:cNvPr id="63" name="Forma Livre 62">
-                <a:extLst>
-                  <a:ext uri="{FF2B5EF4-FFF2-40B4-BE49-F238E27FC236}">
-                    <a16:creationId xmlns:a16="http://schemas.microsoft.com/office/drawing/2014/main" id="{CC94004C-AA53-B44E-93FA-EB9B4D76CDD7}"/>
-                  </a:ext>
-                </a:extLst>
-              </p:cNvPr>
-              <p:cNvSpPr/>
-              <p:nvPr/>
-            </p:nvSpPr>
-            <p:spPr>
-              <a:xfrm rot="7516964">
-                <a:off x="7511354" y="1805317"/>
-                <a:ext cx="1004943" cy="3161183"/>
-              </a:xfrm>
-              <a:custGeom>
-                <a:avLst/>
-                <a:gdLst>
-                  <a:gd name="connsiteX0" fmla="*/ 514752 w 520218"/>
-                  <a:gd name="connsiteY0" fmla="*/ 970250 h 970253"/>
-                  <a:gd name="connsiteX1" fmla="*/ 5466 w 520218"/>
-                  <a:gd name="connsiteY1" fmla="*/ 113723 h 970253"/>
-                  <a:gd name="connsiteX2" fmla="*/ 260109 w 520218"/>
-                  <a:gd name="connsiteY2" fmla="*/ 102148 h 970253"/>
-                  <a:gd name="connsiteX3" fmla="*/ 514752 w 520218"/>
-                  <a:gd name="connsiteY3" fmla="*/ 970250 h 970253"/>
-                  <a:gd name="connsiteX0" fmla="*/ 514752 w 520218"/>
-                  <a:gd name="connsiteY0" fmla="*/ 970250 h 970280"/>
-                  <a:gd name="connsiteX1" fmla="*/ 5466 w 520218"/>
-                  <a:gd name="connsiteY1" fmla="*/ 113723 h 970280"/>
-                  <a:gd name="connsiteX2" fmla="*/ 260109 w 520218"/>
-                  <a:gd name="connsiteY2" fmla="*/ 102148 h 970280"/>
-                  <a:gd name="connsiteX3" fmla="*/ 514752 w 520218"/>
-                  <a:gd name="connsiteY3" fmla="*/ 970250 h 970280"/>
-                  <a:gd name="connsiteX0" fmla="*/ 513044 w 516801"/>
-                  <a:gd name="connsiteY0" fmla="*/ 1042391 h 1042421"/>
-                  <a:gd name="connsiteX1" fmla="*/ 3758 w 516801"/>
-                  <a:gd name="connsiteY1" fmla="*/ 185864 h 1042421"/>
-                  <a:gd name="connsiteX2" fmla="*/ 258401 w 516801"/>
-                  <a:gd name="connsiteY2" fmla="*/ 174289 h 1042421"/>
-                  <a:gd name="connsiteX3" fmla="*/ 513044 w 516801"/>
-                  <a:gd name="connsiteY3" fmla="*/ 1042391 h 1042421"/>
-                  <a:gd name="connsiteX0" fmla="*/ 511887 w 514487"/>
-                  <a:gd name="connsiteY0" fmla="*/ 1097673 h 1097703"/>
-                  <a:gd name="connsiteX1" fmla="*/ 2601 w 514487"/>
-                  <a:gd name="connsiteY1" fmla="*/ 241146 h 1097703"/>
-                  <a:gd name="connsiteX2" fmla="*/ 257244 w 514487"/>
-                  <a:gd name="connsiteY2" fmla="*/ 229571 h 1097703"/>
-                  <a:gd name="connsiteX3" fmla="*/ 511887 w 514487"/>
-                  <a:gd name="connsiteY3" fmla="*/ 1097673 h 1097703"/>
-                  <a:gd name="connsiteX0" fmla="*/ 512443 w 515600"/>
-                  <a:gd name="connsiteY0" fmla="*/ 957151 h 957181"/>
-                  <a:gd name="connsiteX1" fmla="*/ 3157 w 515600"/>
-                  <a:gd name="connsiteY1" fmla="*/ 100624 h 957181"/>
-                  <a:gd name="connsiteX2" fmla="*/ 257800 w 515600"/>
-                  <a:gd name="connsiteY2" fmla="*/ 89049 h 957181"/>
-                  <a:gd name="connsiteX3" fmla="*/ 512443 w 515600"/>
-                  <a:gd name="connsiteY3" fmla="*/ 957151 h 957181"/>
-                  <a:gd name="connsiteX0" fmla="*/ 566129 w 570856"/>
-                  <a:gd name="connsiteY0" fmla="*/ 1067522 h 1067537"/>
-                  <a:gd name="connsiteX1" fmla="*/ 5741 w 570856"/>
-                  <a:gd name="connsiteY1" fmla="*/ 119693 h 1067537"/>
-                  <a:gd name="connsiteX2" fmla="*/ 260384 w 570856"/>
-                  <a:gd name="connsiteY2" fmla="*/ 108118 h 1067537"/>
-                  <a:gd name="connsiteX3" fmla="*/ 566129 w 570856"/>
-                  <a:gd name="connsiteY3" fmla="*/ 1067522 h 1067537"/>
-                  <a:gd name="connsiteX0" fmla="*/ 573429 w 578420"/>
-                  <a:gd name="connsiteY0" fmla="*/ 1331738 h 1334451"/>
-                  <a:gd name="connsiteX1" fmla="*/ 5595 w 578420"/>
-                  <a:gd name="connsiteY1" fmla="*/ 41825 h 1334451"/>
-                  <a:gd name="connsiteX2" fmla="*/ 267684 w 578420"/>
-                  <a:gd name="connsiteY2" fmla="*/ 372334 h 1334451"/>
-                  <a:gd name="connsiteX3" fmla="*/ 573429 w 578420"/>
-                  <a:gd name="connsiteY3" fmla="*/ 1331738 h 1334451"/>
-                  <a:gd name="connsiteX0" fmla="*/ 576670 w 578414"/>
-                  <a:gd name="connsiteY0" fmla="*/ 1392675 h 1392764"/>
-                  <a:gd name="connsiteX1" fmla="*/ 8836 w 578414"/>
-                  <a:gd name="connsiteY1" fmla="*/ 102762 h 1392764"/>
-                  <a:gd name="connsiteX2" fmla="*/ 180218 w 578414"/>
-                  <a:gd name="connsiteY2" fmla="*/ 169020 h 1392764"/>
-                  <a:gd name="connsiteX3" fmla="*/ 576670 w 578414"/>
-                  <a:gd name="connsiteY3" fmla="*/ 1392675 h 1392764"/>
-                  <a:gd name="connsiteX0" fmla="*/ 609240 w 610984"/>
-                  <a:gd name="connsiteY0" fmla="*/ 1392675 h 1392764"/>
-                  <a:gd name="connsiteX1" fmla="*/ 41406 w 610984"/>
-                  <a:gd name="connsiteY1" fmla="*/ 102762 h 1392764"/>
-                  <a:gd name="connsiteX2" fmla="*/ 212788 w 610984"/>
-                  <a:gd name="connsiteY2" fmla="*/ 169020 h 1392764"/>
-                  <a:gd name="connsiteX3" fmla="*/ 609240 w 610984"/>
-                  <a:gd name="connsiteY3" fmla="*/ 1392675 h 1392764"/>
-                  <a:gd name="connsiteX0" fmla="*/ 609240 w 610393"/>
-                  <a:gd name="connsiteY0" fmla="*/ 1416515 h 1416610"/>
-                  <a:gd name="connsiteX1" fmla="*/ 41406 w 610393"/>
-                  <a:gd name="connsiteY1" fmla="*/ 126602 h 1416610"/>
-                  <a:gd name="connsiteX2" fmla="*/ 212788 w 610393"/>
-                  <a:gd name="connsiteY2" fmla="*/ 192860 h 1416610"/>
-                  <a:gd name="connsiteX3" fmla="*/ 609240 w 610393"/>
-                  <a:gd name="connsiteY3" fmla="*/ 1416515 h 1416610"/>
-                  <a:gd name="connsiteX0" fmla="*/ 609240 w 610140"/>
-                  <a:gd name="connsiteY0" fmla="*/ 1469318 h 1469428"/>
-                  <a:gd name="connsiteX1" fmla="*/ 41406 w 610140"/>
-                  <a:gd name="connsiteY1" fmla="*/ 179405 h 1469428"/>
-                  <a:gd name="connsiteX2" fmla="*/ 212788 w 610140"/>
-                  <a:gd name="connsiteY2" fmla="*/ 245663 h 1469428"/>
-                  <a:gd name="connsiteX3" fmla="*/ 609240 w 610140"/>
-                  <a:gd name="connsiteY3" fmla="*/ 1469318 h 1469428"/>
-                  <a:gd name="connsiteX0" fmla="*/ 522775 w 524999"/>
-                  <a:gd name="connsiteY0" fmla="*/ 1316581 h 1316675"/>
-                  <a:gd name="connsiteX1" fmla="*/ 45945 w 524999"/>
-                  <a:gd name="connsiteY1" fmla="*/ 98735 h 1316675"/>
-                  <a:gd name="connsiteX2" fmla="*/ 217327 w 524999"/>
-                  <a:gd name="connsiteY2" fmla="*/ 164993 h 1316675"/>
-                  <a:gd name="connsiteX3" fmla="*/ 522775 w 524999"/>
-                  <a:gd name="connsiteY3" fmla="*/ 1316581 h 1316675"/>
-                  <a:gd name="connsiteX0" fmla="*/ 522775 w 524057"/>
-                  <a:gd name="connsiteY0" fmla="*/ 1362217 h 1362325"/>
-                  <a:gd name="connsiteX1" fmla="*/ 45945 w 524057"/>
-                  <a:gd name="connsiteY1" fmla="*/ 144371 h 1362325"/>
-                  <a:gd name="connsiteX2" fmla="*/ 217327 w 524057"/>
-                  <a:gd name="connsiteY2" fmla="*/ 210629 h 1362325"/>
-                  <a:gd name="connsiteX3" fmla="*/ 522775 w 524057"/>
-                  <a:gd name="connsiteY3" fmla="*/ 1362217 h 1362325"/>
-                  <a:gd name="connsiteX0" fmla="*/ 485268 w 486550"/>
-                  <a:gd name="connsiteY0" fmla="*/ 1362217 h 1362325"/>
-                  <a:gd name="connsiteX1" fmla="*/ 8438 w 486550"/>
-                  <a:gd name="connsiteY1" fmla="*/ 144371 h 1362325"/>
-                  <a:gd name="connsiteX2" fmla="*/ 179820 w 486550"/>
-                  <a:gd name="connsiteY2" fmla="*/ 210629 h 1362325"/>
-                  <a:gd name="connsiteX3" fmla="*/ 485268 w 486550"/>
-                  <a:gd name="connsiteY3" fmla="*/ 1362217 h 1362325"/>
-                  <a:gd name="connsiteX0" fmla="*/ 485268 w 486358"/>
-                  <a:gd name="connsiteY0" fmla="*/ 1378731 h 1378845"/>
-                  <a:gd name="connsiteX1" fmla="*/ 8438 w 486358"/>
-                  <a:gd name="connsiteY1" fmla="*/ 160885 h 1378845"/>
-                  <a:gd name="connsiteX2" fmla="*/ 179820 w 486358"/>
-                  <a:gd name="connsiteY2" fmla="*/ 227143 h 1378845"/>
-                  <a:gd name="connsiteX3" fmla="*/ 485268 w 486358"/>
-                  <a:gd name="connsiteY3" fmla="*/ 1378731 h 1378845"/>
-                  <a:gd name="connsiteX0" fmla="*/ 485268 w 486329"/>
-                  <a:gd name="connsiteY0" fmla="*/ 1377758 h 1377871"/>
-                  <a:gd name="connsiteX1" fmla="*/ 8438 w 486329"/>
-                  <a:gd name="connsiteY1" fmla="*/ 159912 h 1377871"/>
-                  <a:gd name="connsiteX2" fmla="*/ 179820 w 486329"/>
-                  <a:gd name="connsiteY2" fmla="*/ 226170 h 1377871"/>
-                  <a:gd name="connsiteX3" fmla="*/ 485268 w 486329"/>
-                  <a:gd name="connsiteY3" fmla="*/ 1377758 h 1377871"/>
-                  <a:gd name="connsiteX0" fmla="*/ 485422 w 487383"/>
-                  <a:gd name="connsiteY0" fmla="*/ 1377758 h 1380780"/>
-                  <a:gd name="connsiteX1" fmla="*/ 8592 w 487383"/>
-                  <a:gd name="connsiteY1" fmla="*/ 159912 h 1380780"/>
-                  <a:gd name="connsiteX2" fmla="*/ 179974 w 487383"/>
-                  <a:gd name="connsiteY2" fmla="*/ 226170 h 1380780"/>
-                  <a:gd name="connsiteX3" fmla="*/ 485422 w 487383"/>
-                  <a:gd name="connsiteY3" fmla="*/ 1377758 h 1380780"/>
-                </a:gdLst>
-                <a:ahLst/>
-                <a:cxnLst>
-                  <a:cxn ang="0">
-                    <a:pos x="connsiteX0" y="connsiteY0"/>
-                  </a:cxn>
-                  <a:cxn ang="0">
-                    <a:pos x="connsiteX1" y="connsiteY1"/>
-                  </a:cxn>
-                  <a:cxn ang="0">
-                    <a:pos x="connsiteX2" y="connsiteY2"/>
-                  </a:cxn>
-                  <a:cxn ang="0">
-                    <a:pos x="connsiteX3" y="connsiteY3"/>
-                  </a:cxn>
-                </a:cxnLst>
-                <a:rect l="l" t="t" r="r" b="b"/>
-                <a:pathLst>
-                  <a:path w="487383" h="1380780">
-                    <a:moveTo>
-                      <a:pt x="485422" y="1377758"/>
-                    </a:moveTo>
-                    <a:cubicBezTo>
-                      <a:pt x="446006" y="1317890"/>
-                      <a:pt x="-72495" y="919901"/>
-                      <a:pt x="8592" y="159912"/>
-                    </a:cubicBezTo>
-                    <a:cubicBezTo>
-                      <a:pt x="-33848" y="15228"/>
-                      <a:pt x="405407" y="-140145"/>
-                      <a:pt x="179974" y="226170"/>
-                    </a:cubicBezTo>
-                    <a:cubicBezTo>
-                      <a:pt x="-45459" y="592485"/>
-                      <a:pt x="524838" y="1437626"/>
-                      <a:pt x="485422" y="1377758"/>
-                    </a:cubicBezTo>
-                    <a:close/>
-                  </a:path>
-                </a:pathLst>
-              </a:custGeom>
-              <a:solidFill>
-                <a:schemeClr val="accent1"/>
-              </a:solidFill>
-              <a:ln w="9426" cap="flat">
-                <a:noFill/>
-                <a:prstDash val="solid"/>
-                <a:miter/>
-              </a:ln>
-            </p:spPr>
-            <p:style>
-              <a:lnRef idx="2">
-                <a:schemeClr val="accent1">
-                  <a:shade val="50000"/>
-                </a:schemeClr>
-              </a:lnRef>
-              <a:fillRef idx="1">
-                <a:schemeClr val="accent1"/>
-              </a:fillRef>
-              <a:effectRef idx="0">
-                <a:schemeClr val="accent1"/>
-              </a:effectRef>
-              <a:fontRef idx="minor">
-                <a:schemeClr val="lt1"/>
-              </a:fontRef>
-            </p:style>
-            <p:txBody>
-              <a:bodyPr rtlCol="0" anchor="ctr"/>
-              <a:lstStyle/>
-              <a:p>
-                <a:pPr algn="ctr"/>
-                <a:endParaRPr lang="pt-BR"/>
-              </a:p>
-            </p:txBody>
-          </p:sp>
-        </p:grpSp>
-        <p:sp>
-          <p:nvSpPr>
-            <p:cNvPr id="60" name="Triângulo 59">
-              <a:extLst>
-                <a:ext uri="{FF2B5EF4-FFF2-40B4-BE49-F238E27FC236}">
-                  <a16:creationId xmlns:a16="http://schemas.microsoft.com/office/drawing/2014/main" id="{D390EC3C-44BE-D945-8912-CF5E8F0C6AF7}"/>
-                </a:ext>
-              </a:extLst>
-            </p:cNvPr>
-            <p:cNvSpPr/>
-            <p:nvPr/>
-          </p:nvSpPr>
-          <p:spPr>
-            <a:xfrm rot="9273799">
-              <a:off x="8843821" y="3774533"/>
-              <a:ext cx="863561" cy="621252"/>
-            </a:xfrm>
-            <a:prstGeom prst="triangle">
-              <a:avLst>
-                <a:gd name="adj" fmla="val 50046"/>
-              </a:avLst>
-            </a:prstGeom>
-            <a:solidFill>
-              <a:schemeClr val="accent1"/>
-            </a:solidFill>
-            <a:ln w="9426" cap="flat">
-              <a:noFill/>
-              <a:prstDash val="solid"/>
-              <a:miter/>
-            </a:ln>
-          </p:spPr>
-          <p:style>
-            <a:lnRef idx="2">
-              <a:schemeClr val="accent1">
-                <a:shade val="50000"/>
-              </a:schemeClr>
-            </a:lnRef>
-            <a:fillRef idx="1">
-              <a:schemeClr val="accent1"/>
-            </a:fillRef>
-            <a:effectRef idx="0">
-              <a:schemeClr val="accent1"/>
-            </a:effectRef>
-            <a:fontRef idx="minor">
-              <a:schemeClr val="lt1"/>
-            </a:fontRef>
-          </p:style>
-          <p:txBody>
-            <a:bodyPr rtlCol="0" anchor="ctr"/>
-            <a:lstStyle/>
-            <a:p>
-              <a:pPr algn="ctr"/>
-              <a:endParaRPr lang="pt-BR"/>
-            </a:p>
-          </p:txBody>
-        </p:sp>
-      </p:grpSp>
-      <p:sp>
-        <p:nvSpPr>
-          <p:cNvPr id="16" name="Retângulo Arredondado 15">
-            <a:extLst>
-              <a:ext uri="{FF2B5EF4-FFF2-40B4-BE49-F238E27FC236}">
-                <a16:creationId xmlns:a16="http://schemas.microsoft.com/office/drawing/2014/main" id="{07D88B1E-B258-304F-9CFB-920C3019E689}"/>
-              </a:ext>
-            </a:extLst>
-          </p:cNvPr>
-          <p:cNvSpPr/>
-          <p:nvPr/>
-        </p:nvSpPr>
-        <p:spPr>
-          <a:xfrm>
-            <a:off x="4517233" y="2718597"/>
-            <a:ext cx="1803117" cy="568270"/>
-          </a:xfrm>
-          <a:prstGeom prst="roundRect">
-            <a:avLst/>
-          </a:prstGeom>
-          <a:solidFill>
-            <a:schemeClr val="accent6">
-              <a:lumMod val="40000"/>
-              <a:lumOff val="60000"/>
-            </a:schemeClr>
-          </a:solidFill>
-          <a:ln>
-            <a:solidFill>
-              <a:schemeClr val="accent6">
-                <a:lumMod val="75000"/>
-              </a:schemeClr>
-            </a:solidFill>
-          </a:ln>
-        </p:spPr>
-        <p:style>
-          <a:lnRef idx="2">
-            <a:schemeClr val="accent1">
-              <a:shade val="50000"/>
-            </a:schemeClr>
-          </a:lnRef>
-          <a:fillRef idx="1">
-            <a:schemeClr val="accent1"/>
-          </a:fillRef>
-          <a:effectRef idx="0">
-            <a:schemeClr val="accent1"/>
-          </a:effectRef>
-          <a:fontRef idx="minor">
-            <a:schemeClr val="lt1"/>
-          </a:fontRef>
-        </p:style>
-        <p:txBody>
-          <a:bodyPr rtlCol="0" anchor="ctr"/>
-          <a:lstStyle/>
-          <a:p>
-            <a:pPr algn="ctr"/>
-            <a:r>
-              <a:rPr lang="pt-BR" sz="1200" dirty="0">
-                <a:solidFill>
-                  <a:schemeClr val="tx1"/>
-                </a:solidFill>
-              </a:rPr>
-              <a:t>Service</a:t>
-            </a:r>
-          </a:p>
-        </p:txBody>
-      </p:sp>
-      <p:sp>
-        <p:nvSpPr>
-          <p:cNvPr id="66" name="Google Shape;74;p15">
-            <a:extLst>
-              <a:ext uri="{FF2B5EF4-FFF2-40B4-BE49-F238E27FC236}">
-                <a16:creationId xmlns:a16="http://schemas.microsoft.com/office/drawing/2014/main" id="{DD82DAB9-4BCB-8349-8166-D739225E39FC}"/>
-              </a:ext>
-            </a:extLst>
-          </p:cNvPr>
-          <p:cNvSpPr txBox="1">
-            <a:spLocks/>
-          </p:cNvSpPr>
-          <p:nvPr/>
-        </p:nvSpPr>
-        <p:spPr>
-          <a:xfrm>
-            <a:off x="311700" y="305700"/>
-            <a:ext cx="11360800" cy="591300"/>
-          </a:xfrm>
-          <a:prstGeom prst="rect">
-            <a:avLst/>
-          </a:prstGeom>
-        </p:spPr>
-        <p:txBody>
-          <a:bodyPr spcFirstLastPara="1" vert="horz" wrap="square" lIns="91425" tIns="91425" rIns="91425" bIns="91425" rtlCol="0" anchor="ctr" anchorCtr="0">
-            <a:noAutofit/>
-          </a:bodyPr>
-          <a:lstStyle>
-            <a:lvl1pPr marL="0" indent="0" algn="ctr" defTabSz="914400" rtl="0" eaLnBrk="1" latinLnBrk="0" hangingPunct="1">
-              <a:lnSpc>
-                <a:spcPct val="90000"/>
-              </a:lnSpc>
-              <a:spcBef>
-                <a:spcPts val="1000"/>
-              </a:spcBef>
-              <a:buFont typeface="Arial" panose="020B0604020202020204" pitchFamily="34" charset="0"/>
-              <a:buNone/>
-              <a:defRPr sz="2400" kern="1200">
-                <a:solidFill>
-                  <a:schemeClr val="tx1"/>
-                </a:solidFill>
-                <a:latin typeface="+mn-lt"/>
-                <a:ea typeface="+mn-ea"/>
-                <a:cs typeface="+mn-cs"/>
-              </a:defRPr>
-            </a:lvl1pPr>
-            <a:lvl2pPr marL="457200" indent="0" algn="ctr" defTabSz="914400" rtl="0" eaLnBrk="1" latinLnBrk="0" hangingPunct="1">
-              <a:lnSpc>
-                <a:spcPct val="90000"/>
-              </a:lnSpc>
-              <a:spcBef>
-                <a:spcPts val="500"/>
-              </a:spcBef>
-              <a:buFont typeface="Arial" panose="020B0604020202020204" pitchFamily="34" charset="0"/>
-              <a:buNone/>
-              <a:defRPr sz="2000" kern="1200">
-                <a:solidFill>
-                  <a:schemeClr val="tx1"/>
-                </a:solidFill>
-                <a:latin typeface="+mn-lt"/>
-                <a:ea typeface="+mn-ea"/>
-                <a:cs typeface="+mn-cs"/>
-              </a:defRPr>
-            </a:lvl2pPr>
-            <a:lvl3pPr marL="914400" indent="0" algn="ctr" defTabSz="914400" rtl="0" eaLnBrk="1" latinLnBrk="0" hangingPunct="1">
-              <a:lnSpc>
-                <a:spcPct val="90000"/>
-              </a:lnSpc>
-              <a:spcBef>
-                <a:spcPts val="500"/>
-              </a:spcBef>
-              <a:buFont typeface="Arial" panose="020B0604020202020204" pitchFamily="34" charset="0"/>
-              <a:buNone/>
-              <a:defRPr sz="1800" kern="1200">
-                <a:solidFill>
-                  <a:schemeClr val="tx1"/>
-                </a:solidFill>
-                <a:latin typeface="+mn-lt"/>
-                <a:ea typeface="+mn-ea"/>
-                <a:cs typeface="+mn-cs"/>
-              </a:defRPr>
-            </a:lvl3pPr>
-            <a:lvl4pPr marL="1371600" indent="0" algn="ctr" defTabSz="914400" rtl="0" eaLnBrk="1" latinLnBrk="0" hangingPunct="1">
-              <a:lnSpc>
-                <a:spcPct val="90000"/>
-              </a:lnSpc>
-              <a:spcBef>
-                <a:spcPts val="500"/>
-              </a:spcBef>
-              <a:buFont typeface="Arial" panose="020B0604020202020204" pitchFamily="34" charset="0"/>
-              <a:buNone/>
-              <a:defRPr sz="1600" kern="1200">
-                <a:solidFill>
-                  <a:schemeClr val="tx1"/>
-                </a:solidFill>
-                <a:latin typeface="+mn-lt"/>
-                <a:ea typeface="+mn-ea"/>
-                <a:cs typeface="+mn-cs"/>
-              </a:defRPr>
-            </a:lvl4pPr>
-            <a:lvl5pPr marL="1828800" indent="0" algn="ctr" defTabSz="914400" rtl="0" eaLnBrk="1" latinLnBrk="0" hangingPunct="1">
-              <a:lnSpc>
-                <a:spcPct val="90000"/>
-              </a:lnSpc>
-              <a:spcBef>
-                <a:spcPts val="500"/>
-              </a:spcBef>
-              <a:buFont typeface="Arial" panose="020B0604020202020204" pitchFamily="34" charset="0"/>
-              <a:buNone/>
-              <a:defRPr sz="1600" kern="1200">
-                <a:solidFill>
-                  <a:schemeClr val="tx1"/>
-                </a:solidFill>
-                <a:latin typeface="+mn-lt"/>
-                <a:ea typeface="+mn-ea"/>
-                <a:cs typeface="+mn-cs"/>
-              </a:defRPr>
-            </a:lvl5pPr>
-            <a:lvl6pPr marL="2286000" indent="0" algn="ctr" defTabSz="914400" rtl="0" eaLnBrk="1" latinLnBrk="0" hangingPunct="1">
-              <a:lnSpc>
-                <a:spcPct val="90000"/>
-              </a:lnSpc>
-              <a:spcBef>
-                <a:spcPts val="500"/>
-              </a:spcBef>
-              <a:buFont typeface="Arial" panose="020B0604020202020204" pitchFamily="34" charset="0"/>
-              <a:buNone/>
-              <a:defRPr sz="1600" kern="1200">
-                <a:solidFill>
-                  <a:schemeClr val="tx1"/>
-                </a:solidFill>
-                <a:latin typeface="+mn-lt"/>
-                <a:ea typeface="+mn-ea"/>
-                <a:cs typeface="+mn-cs"/>
-              </a:defRPr>
-            </a:lvl6pPr>
-            <a:lvl7pPr marL="2743200" indent="0" algn="ctr" defTabSz="914400" rtl="0" eaLnBrk="1" latinLnBrk="0" hangingPunct="1">
-              <a:lnSpc>
-                <a:spcPct val="90000"/>
-              </a:lnSpc>
-              <a:spcBef>
-                <a:spcPts val="500"/>
-              </a:spcBef>
-              <a:buFont typeface="Arial" panose="020B0604020202020204" pitchFamily="34" charset="0"/>
-              <a:buNone/>
-              <a:defRPr sz="1600" kern="1200">
-                <a:solidFill>
-                  <a:schemeClr val="tx1"/>
-                </a:solidFill>
-                <a:latin typeface="+mn-lt"/>
-                <a:ea typeface="+mn-ea"/>
-                <a:cs typeface="+mn-cs"/>
-              </a:defRPr>
-            </a:lvl7pPr>
-            <a:lvl8pPr marL="3200400" indent="0" algn="ctr" defTabSz="914400" rtl="0" eaLnBrk="1" latinLnBrk="0" hangingPunct="1">
-              <a:lnSpc>
-                <a:spcPct val="90000"/>
-              </a:lnSpc>
-              <a:spcBef>
-                <a:spcPts val="500"/>
-              </a:spcBef>
-              <a:buFont typeface="Arial" panose="020B0604020202020204" pitchFamily="34" charset="0"/>
-              <a:buNone/>
-              <a:defRPr sz="1600" kern="1200">
-                <a:solidFill>
-                  <a:schemeClr val="tx1"/>
-                </a:solidFill>
-                <a:latin typeface="+mn-lt"/>
-                <a:ea typeface="+mn-ea"/>
-                <a:cs typeface="+mn-cs"/>
-              </a:defRPr>
-            </a:lvl8pPr>
-            <a:lvl9pPr marL="3657600" indent="0" algn="ctr" defTabSz="914400" rtl="0" eaLnBrk="1" latinLnBrk="0" hangingPunct="1">
-              <a:lnSpc>
-                <a:spcPct val="90000"/>
-              </a:lnSpc>
-              <a:spcBef>
-                <a:spcPts val="500"/>
-              </a:spcBef>
-              <a:buFont typeface="Arial" panose="020B0604020202020204" pitchFamily="34" charset="0"/>
-              <a:buNone/>
-              <a:defRPr sz="1600" kern="1200">
-                <a:solidFill>
-                  <a:schemeClr val="tx1"/>
-                </a:solidFill>
-                <a:latin typeface="+mn-lt"/>
-                <a:ea typeface="+mn-ea"/>
-                <a:cs typeface="+mn-cs"/>
-              </a:defRPr>
-            </a:lvl9pPr>
-          </a:lstStyle>
-          <a:p>
-            <a:pPr>
-              <a:spcBef>
-                <a:spcPts val="0"/>
-              </a:spcBef>
-              <a:buClr>
-                <a:schemeClr val="dk1"/>
-              </a:buClr>
-              <a:buSzPts val="1100"/>
-            </a:pPr>
-            <a:r>
-              <a:rPr lang="pt-BR" sz="4000" b="1" dirty="0">
-                <a:solidFill>
-                  <a:srgbClr val="073763"/>
-                </a:solidFill>
-                <a:latin typeface="Century Gothic" panose="020B0502020202020204" pitchFamily="34" charset="0"/>
-                <a:ea typeface="Proxima Nova"/>
-                <a:cs typeface="Proxima Nova"/>
-                <a:sym typeface="Proxima Nova"/>
-              </a:rPr>
-              <a:t>&gt;_Service</a:t>
-            </a:r>
-          </a:p>
-        </p:txBody>
-      </p:sp>
-    </p:spTree>
-    <p:extLst>
-      <p:ext uri="{BB962C8B-B14F-4D97-AF65-F5344CB8AC3E}">
-        <p14:creationId xmlns:p14="http://schemas.microsoft.com/office/powerpoint/2010/main" val="3768309880"/>
-      </p:ext>
-    </p:extLst>
-  </p:cSld>
-  <p:clrMapOvr>
-    <a:masterClrMapping/>
-  </p:clrMapOvr>
-  <mc:AlternateContent xmlns:mc="http://schemas.openxmlformats.org/markup-compatibility/2006" xmlns:p14="http://schemas.microsoft.com/office/powerpoint/2010/main">
-    <mc:Choice Requires="p14">
-      <p:transition spd="med" p14:dur="700">
-        <p:fade/>
-      </p:transition>
-    </mc:Choice>
-    <mc:Fallback xmlns="">
-      <p:transition spd="med">
-        <p:fade/>
-      </p:transition>
-    </mc:Fallback>
-  </mc:AlternateContent>
-  <p:timing>
-    <p:tnLst>
-      <p:par>
-        <p:cTn id="1" dur="indefinite" restart="never" nodeType="tmRoot">
-          <p:childTnLst>
-            <p:seq concurrent="1" nextAc="seek">
-              <p:cTn id="2" dur="indefinite" nodeType="mainSeq">
-                <p:childTnLst>
-                  <p:par>
-                    <p:cTn id="3" fill="hold">
-                      <p:stCondLst>
-                        <p:cond delay="indefinite"/>
-                      </p:stCondLst>
-                      <p:childTnLst>
-                        <p:par>
-                          <p:cTn id="4" fill="hold">
-                            <p:stCondLst>
-                              <p:cond delay="0"/>
-                            </p:stCondLst>
-                            <p:childTnLst>
-                              <p:par>
-                                <p:cTn id="5" presetID="22" presetClass="entr" presetSubtype="4" fill="hold" nodeType="clickEffect">
-                                  <p:stCondLst>
-                                    <p:cond delay="0"/>
-                                  </p:stCondLst>
-                                  <p:childTnLst>
-                                    <p:set>
-                                      <p:cBhvr>
-                                        <p:cTn id="6" dur="1" fill="hold">
-                                          <p:stCondLst>
-                                            <p:cond delay="0"/>
-                                          </p:stCondLst>
-                                        </p:cTn>
-                                        <p:tgtEl>
-                                          <p:spTgt spid="45"/>
-                                        </p:tgtEl>
-                                        <p:attrNameLst>
-                                          <p:attrName>style.visibility</p:attrName>
-                                        </p:attrNameLst>
-                                      </p:cBhvr>
-                                      <p:to>
-                                        <p:strVal val="visible"/>
-                                      </p:to>
-                                    </p:set>
-                                    <p:animEffect transition="in" filter="wipe(down)">
-                                      <p:cBhvr>
-                                        <p:cTn id="7" dur="500"/>
-                                        <p:tgtEl>
-                                          <p:spTgt spid="45"/>
-                                        </p:tgtEl>
-                                      </p:cBhvr>
-                                    </p:animEffect>
-                                  </p:childTnLst>
-                                </p:cTn>
-                              </p:par>
-                            </p:childTnLst>
-                          </p:cTn>
-                        </p:par>
-                      </p:childTnLst>
-                    </p:cTn>
-                  </p:par>
-                  <p:par>
-                    <p:cTn id="8" fill="hold">
-                      <p:stCondLst>
-                        <p:cond delay="indefinite"/>
-                      </p:stCondLst>
-                      <p:childTnLst>
-                        <p:par>
-                          <p:cTn id="9" fill="hold">
-                            <p:stCondLst>
-                              <p:cond delay="0"/>
-                            </p:stCondLst>
-                            <p:childTnLst>
-                              <p:par>
-                                <p:cTn id="10" presetID="22" presetClass="entr" presetSubtype="8" fill="hold" nodeType="clickEffect">
-                                  <p:stCondLst>
-                                    <p:cond delay="0"/>
-                                  </p:stCondLst>
-                                  <p:childTnLst>
-                                    <p:set>
-                                      <p:cBhvr>
-                                        <p:cTn id="11" dur="1" fill="hold">
-                                          <p:stCondLst>
-                                            <p:cond delay="0"/>
-                                          </p:stCondLst>
-                                        </p:cTn>
-                                        <p:tgtEl>
-                                          <p:spTgt spid="67"/>
-                                        </p:tgtEl>
-                                        <p:attrNameLst>
-                                          <p:attrName>style.visibility</p:attrName>
-                                        </p:attrNameLst>
-                                      </p:cBhvr>
-                                      <p:to>
-                                        <p:strVal val="visible"/>
-                                      </p:to>
-                                    </p:set>
-                                    <p:animEffect transition="in" filter="wipe(left)">
-                                      <p:cBhvr>
-                                        <p:cTn id="12" dur="500"/>
-                                        <p:tgtEl>
-                                          <p:spTgt spid="67"/>
-                                        </p:tgtEl>
-                                      </p:cBhvr>
-                                    </p:animEffect>
-                                  </p:childTnLst>
-                                </p:cTn>
-                              </p:par>
-                            </p:childTnLst>
-                          </p:cTn>
-                        </p:par>
-                      </p:childTnLst>
-                    </p:cTn>
-                  </p:par>
-                </p:childTnLst>
-              </p:cTn>
-              <p:prevCondLst>
-                <p:cond evt="onPrev" delay="0">
-                  <p:tgtEl>
-                    <p:sldTgt/>
-                  </p:tgtEl>
-                </p:cond>
-              </p:prevCondLst>
-              <p:nextCondLst>
-                <p:cond evt="onNext" delay="0">
-                  <p:tgtEl>
-                    <p:sldTgt/>
-                  </p:tgtEl>
-                </p:cond>
-              </p:nextCondLst>
-            </p:seq>
-          </p:childTnLst>
-        </p:cTn>
-      </p:par>
-    </p:tnLst>
-  </p:timing>
-</p:sld>
-</file>
-
-<file path=ppt/slides/slide22.xml><?xml version="1.0" encoding="utf-8"?>
-<p:sld xmlns:a="http://schemas.openxmlformats.org/drawingml/2006/main" xmlns:r="http://schemas.openxmlformats.org/officeDocument/2006/relationships" xmlns:p="http://schemas.openxmlformats.org/presentationml/2006/main">
-  <p:cSld>
-    <p:spTree>
-      <p:nvGrpSpPr>
-        <p:cNvPr id="1" name=""/>
-        <p:cNvGrpSpPr/>
-        <p:nvPr/>
-      </p:nvGrpSpPr>
-      <p:grpSpPr>
-        <a:xfrm>
-          <a:off x="0" y="0"/>
-          <a:ext cx="0" cy="0"/>
-          <a:chOff x="0" y="0"/>
-          <a:chExt cx="0" cy="0"/>
-        </a:xfrm>
-      </p:grpSpPr>
-      <p:sp>
-        <p:nvSpPr>
-          <p:cNvPr id="66" name="Google Shape;74;p15">
-            <a:extLst>
-              <a:ext uri="{FF2B5EF4-FFF2-40B4-BE49-F238E27FC236}">
-                <a16:creationId xmlns:a16="http://schemas.microsoft.com/office/drawing/2014/main" id="{DD82DAB9-4BCB-8349-8166-D739225E39FC}"/>
-              </a:ext>
-            </a:extLst>
-          </p:cNvPr>
-          <p:cNvSpPr txBox="1">
-            <a:spLocks/>
-          </p:cNvSpPr>
-          <p:nvPr/>
-        </p:nvSpPr>
-        <p:spPr>
-          <a:xfrm>
-            <a:off x="311700" y="305699"/>
-            <a:ext cx="11360800" cy="1195497"/>
-          </a:xfrm>
-          <a:prstGeom prst="rect">
-            <a:avLst/>
-          </a:prstGeom>
-        </p:spPr>
-        <p:txBody>
-          <a:bodyPr spcFirstLastPara="1" vert="horz" wrap="square" lIns="91425" tIns="91425" rIns="91425" bIns="91425" rtlCol="0" anchor="ctr" anchorCtr="0">
-            <a:noAutofit/>
-          </a:bodyPr>
-          <a:lstStyle>
-            <a:lvl1pPr marL="0" indent="0" algn="ctr" defTabSz="914400" rtl="0" eaLnBrk="1" latinLnBrk="0" hangingPunct="1">
-              <a:lnSpc>
-                <a:spcPct val="90000"/>
-              </a:lnSpc>
-              <a:spcBef>
-                <a:spcPts val="1000"/>
-              </a:spcBef>
-              <a:buFont typeface="Arial" panose="020B0604020202020204" pitchFamily="34" charset="0"/>
-              <a:buNone/>
-              <a:defRPr sz="2400" kern="1200">
-                <a:solidFill>
-                  <a:schemeClr val="tx1"/>
-                </a:solidFill>
-                <a:latin typeface="+mn-lt"/>
-                <a:ea typeface="+mn-ea"/>
-                <a:cs typeface="+mn-cs"/>
-              </a:defRPr>
-            </a:lvl1pPr>
-            <a:lvl2pPr marL="457200" indent="0" algn="ctr" defTabSz="914400" rtl="0" eaLnBrk="1" latinLnBrk="0" hangingPunct="1">
-              <a:lnSpc>
-                <a:spcPct val="90000"/>
-              </a:lnSpc>
-              <a:spcBef>
-                <a:spcPts val="500"/>
-              </a:spcBef>
-              <a:buFont typeface="Arial" panose="020B0604020202020204" pitchFamily="34" charset="0"/>
-              <a:buNone/>
-              <a:defRPr sz="2000" kern="1200">
-                <a:solidFill>
-                  <a:schemeClr val="tx1"/>
-                </a:solidFill>
-                <a:latin typeface="+mn-lt"/>
-                <a:ea typeface="+mn-ea"/>
-                <a:cs typeface="+mn-cs"/>
-              </a:defRPr>
-            </a:lvl2pPr>
-            <a:lvl3pPr marL="914400" indent="0" algn="ctr" defTabSz="914400" rtl="0" eaLnBrk="1" latinLnBrk="0" hangingPunct="1">
-              <a:lnSpc>
-                <a:spcPct val="90000"/>
-              </a:lnSpc>
-              <a:spcBef>
-                <a:spcPts val="500"/>
-              </a:spcBef>
-              <a:buFont typeface="Arial" panose="020B0604020202020204" pitchFamily="34" charset="0"/>
-              <a:buNone/>
-              <a:defRPr sz="1800" kern="1200">
-                <a:solidFill>
-                  <a:schemeClr val="tx1"/>
-                </a:solidFill>
-                <a:latin typeface="+mn-lt"/>
-                <a:ea typeface="+mn-ea"/>
-                <a:cs typeface="+mn-cs"/>
-              </a:defRPr>
-            </a:lvl3pPr>
-            <a:lvl4pPr marL="1371600" indent="0" algn="ctr" defTabSz="914400" rtl="0" eaLnBrk="1" latinLnBrk="0" hangingPunct="1">
-              <a:lnSpc>
-                <a:spcPct val="90000"/>
-              </a:lnSpc>
-              <a:spcBef>
-                <a:spcPts val="500"/>
-              </a:spcBef>
-              <a:buFont typeface="Arial" panose="020B0604020202020204" pitchFamily="34" charset="0"/>
-              <a:buNone/>
-              <a:defRPr sz="1600" kern="1200">
-                <a:solidFill>
-                  <a:schemeClr val="tx1"/>
-                </a:solidFill>
-                <a:latin typeface="+mn-lt"/>
-                <a:ea typeface="+mn-ea"/>
-                <a:cs typeface="+mn-cs"/>
-              </a:defRPr>
-            </a:lvl4pPr>
-            <a:lvl5pPr marL="1828800" indent="0" algn="ctr" defTabSz="914400" rtl="0" eaLnBrk="1" latinLnBrk="0" hangingPunct="1">
-              <a:lnSpc>
-                <a:spcPct val="90000"/>
-              </a:lnSpc>
-              <a:spcBef>
-                <a:spcPts val="500"/>
-              </a:spcBef>
-              <a:buFont typeface="Arial" panose="020B0604020202020204" pitchFamily="34" charset="0"/>
-              <a:buNone/>
-              <a:defRPr sz="1600" kern="1200">
-                <a:solidFill>
-                  <a:schemeClr val="tx1"/>
-                </a:solidFill>
-                <a:latin typeface="+mn-lt"/>
-                <a:ea typeface="+mn-ea"/>
-                <a:cs typeface="+mn-cs"/>
-              </a:defRPr>
-            </a:lvl5pPr>
-            <a:lvl6pPr marL="2286000" indent="0" algn="ctr" defTabSz="914400" rtl="0" eaLnBrk="1" latinLnBrk="0" hangingPunct="1">
-              <a:lnSpc>
-                <a:spcPct val="90000"/>
-              </a:lnSpc>
-              <a:spcBef>
-                <a:spcPts val="500"/>
-              </a:spcBef>
-              <a:buFont typeface="Arial" panose="020B0604020202020204" pitchFamily="34" charset="0"/>
-              <a:buNone/>
-              <a:defRPr sz="1600" kern="1200">
-                <a:solidFill>
-                  <a:schemeClr val="tx1"/>
-                </a:solidFill>
-                <a:latin typeface="+mn-lt"/>
-                <a:ea typeface="+mn-ea"/>
-                <a:cs typeface="+mn-cs"/>
-              </a:defRPr>
-            </a:lvl6pPr>
-            <a:lvl7pPr marL="2743200" indent="0" algn="ctr" defTabSz="914400" rtl="0" eaLnBrk="1" latinLnBrk="0" hangingPunct="1">
-              <a:lnSpc>
-                <a:spcPct val="90000"/>
-              </a:lnSpc>
-              <a:spcBef>
-                <a:spcPts val="500"/>
-              </a:spcBef>
-              <a:buFont typeface="Arial" panose="020B0604020202020204" pitchFamily="34" charset="0"/>
-              <a:buNone/>
-              <a:defRPr sz="1600" kern="1200">
-                <a:solidFill>
-                  <a:schemeClr val="tx1"/>
-                </a:solidFill>
-                <a:latin typeface="+mn-lt"/>
-                <a:ea typeface="+mn-ea"/>
-                <a:cs typeface="+mn-cs"/>
-              </a:defRPr>
-            </a:lvl7pPr>
-            <a:lvl8pPr marL="3200400" indent="0" algn="ctr" defTabSz="914400" rtl="0" eaLnBrk="1" latinLnBrk="0" hangingPunct="1">
-              <a:lnSpc>
-                <a:spcPct val="90000"/>
-              </a:lnSpc>
-              <a:spcBef>
-                <a:spcPts val="500"/>
-              </a:spcBef>
-              <a:buFont typeface="Arial" panose="020B0604020202020204" pitchFamily="34" charset="0"/>
-              <a:buNone/>
-              <a:defRPr sz="1600" kern="1200">
-                <a:solidFill>
-                  <a:schemeClr val="tx1"/>
-                </a:solidFill>
-                <a:latin typeface="+mn-lt"/>
-                <a:ea typeface="+mn-ea"/>
-                <a:cs typeface="+mn-cs"/>
-              </a:defRPr>
-            </a:lvl8pPr>
-            <a:lvl9pPr marL="3657600" indent="0" algn="ctr" defTabSz="914400" rtl="0" eaLnBrk="1" latinLnBrk="0" hangingPunct="1">
-              <a:lnSpc>
-                <a:spcPct val="90000"/>
-              </a:lnSpc>
-              <a:spcBef>
-                <a:spcPts val="500"/>
-              </a:spcBef>
-              <a:buFont typeface="Arial" panose="020B0604020202020204" pitchFamily="34" charset="0"/>
-              <a:buNone/>
-              <a:defRPr sz="1600" kern="1200">
-                <a:solidFill>
-                  <a:schemeClr val="tx1"/>
-                </a:solidFill>
-                <a:latin typeface="+mn-lt"/>
-                <a:ea typeface="+mn-ea"/>
-                <a:cs typeface="+mn-cs"/>
-              </a:defRPr>
-            </a:lvl9pPr>
-          </a:lstStyle>
-          <a:p>
-            <a:pPr>
-              <a:spcBef>
-                <a:spcPts val="0"/>
-              </a:spcBef>
-              <a:buClr>
-                <a:schemeClr val="dk1"/>
-              </a:buClr>
-              <a:buSzPts val="1100"/>
-            </a:pPr>
-            <a:r>
-              <a:rPr lang="pt-BR" sz="4000" b="1" dirty="0">
-                <a:solidFill>
-                  <a:srgbClr val="073763"/>
-                </a:solidFill>
-                <a:latin typeface="Century Gothic" panose="020B0502020202020204" pitchFamily="34" charset="0"/>
-                <a:ea typeface="Proxima Nova"/>
-                <a:cs typeface="Proxima Nova"/>
-                <a:sym typeface="Proxima Nova"/>
-              </a:rPr>
-              <a:t>&gt;_Introdução ao </a:t>
-            </a:r>
-            <a:r>
-              <a:rPr lang="pt-BR" sz="4000" b="1" dirty="0" err="1">
-                <a:solidFill>
-                  <a:srgbClr val="073763"/>
-                </a:solidFill>
-                <a:latin typeface="Century Gothic" panose="020B0502020202020204" pitchFamily="34" charset="0"/>
-                <a:ea typeface="Proxima Nova"/>
-                <a:cs typeface="Proxima Nova"/>
-                <a:sym typeface="Proxima Nova"/>
-              </a:rPr>
-              <a:t>RxJs</a:t>
-            </a:r>
-            <a:endParaRPr lang="pt-BR" sz="4000" b="1" dirty="0">
-              <a:solidFill>
-                <a:srgbClr val="073763"/>
-              </a:solidFill>
-              <a:latin typeface="Century Gothic" panose="020B0502020202020204" pitchFamily="34" charset="0"/>
-              <a:ea typeface="Proxima Nova"/>
-              <a:cs typeface="Proxima Nova"/>
-              <a:sym typeface="Proxima Nova"/>
-            </a:endParaRPr>
-          </a:p>
-        </p:txBody>
-      </p:sp>
-      <p:sp>
-        <p:nvSpPr>
-          <p:cNvPr id="14" name="Google Shape;76;p15">
-            <a:extLst>
-              <a:ext uri="{FF2B5EF4-FFF2-40B4-BE49-F238E27FC236}">
-                <a16:creationId xmlns:a16="http://schemas.microsoft.com/office/drawing/2014/main" id="{8FE8C6CB-7AC5-4A4A-A4B5-10A332D34E4A}"/>
-              </a:ext>
-            </a:extLst>
-          </p:cNvPr>
-          <p:cNvSpPr txBox="1">
-            <a:spLocks/>
-          </p:cNvSpPr>
-          <p:nvPr/>
-        </p:nvSpPr>
-        <p:spPr>
-          <a:xfrm>
-            <a:off x="472368" y="1758261"/>
-            <a:ext cx="7614727" cy="1813240"/>
-          </a:xfrm>
-          <a:prstGeom prst="rect">
-            <a:avLst/>
-          </a:prstGeom>
-          <a:noFill/>
-          <a:ln>
-            <a:noFill/>
-          </a:ln>
-        </p:spPr>
-        <p:txBody>
-          <a:bodyPr spcFirstLastPara="1" wrap="square" lIns="121900" tIns="121900" rIns="121900" bIns="121900" anchor="t" anchorCtr="0">
-            <a:noAutofit/>
-          </a:bodyPr>
-          <a:lstStyle>
-            <a:defPPr marR="0" lvl="0" algn="l" rtl="0">
-              <a:lnSpc>
-                <a:spcPct val="100000"/>
-              </a:lnSpc>
-              <a:spcBef>
-                <a:spcPts val="0"/>
-              </a:spcBef>
-              <a:spcAft>
-                <a:spcPts val="0"/>
-              </a:spcAft>
-            </a:defPPr>
-            <a:lvl1pPr marL="457200" marR="0" lvl="0" indent="-342900" algn="ctr" rtl="0">
-              <a:lnSpc>
-                <a:spcPct val="100000"/>
-              </a:lnSpc>
-              <a:spcBef>
-                <a:spcPts val="0"/>
-              </a:spcBef>
-              <a:spcAft>
-                <a:spcPts val="0"/>
-              </a:spcAft>
-              <a:buClr>
-                <a:schemeClr val="dk2"/>
-              </a:buClr>
-              <a:buSzPts val="2800"/>
-              <a:buFont typeface="Arial"/>
-              <a:buNone/>
-              <a:defRPr sz="2800" b="0" i="0" u="none" strike="noStrike" cap="none">
-                <a:solidFill>
-                  <a:schemeClr val="dk2"/>
-                </a:solidFill>
-                <a:latin typeface="Arial"/>
-                <a:ea typeface="Arial"/>
-                <a:cs typeface="Arial"/>
-                <a:sym typeface="Arial"/>
-              </a:defRPr>
-            </a:lvl1pPr>
-            <a:lvl2pPr marL="914400" marR="0" lvl="1" indent="-317500" algn="ctr" rtl="0">
-              <a:lnSpc>
-                <a:spcPct val="100000"/>
-              </a:lnSpc>
-              <a:spcBef>
-                <a:spcPts val="0"/>
-              </a:spcBef>
-              <a:spcAft>
-                <a:spcPts val="0"/>
-              </a:spcAft>
-              <a:buClr>
-                <a:schemeClr val="dk2"/>
-              </a:buClr>
-              <a:buSzPts val="2800"/>
-              <a:buFont typeface="Arial"/>
-              <a:buNone/>
-              <a:defRPr sz="2800" b="0" i="0" u="none" strike="noStrike" cap="none">
-                <a:solidFill>
-                  <a:schemeClr val="dk2"/>
-                </a:solidFill>
-                <a:latin typeface="Arial"/>
-                <a:ea typeface="Arial"/>
-                <a:cs typeface="Arial"/>
-                <a:sym typeface="Arial"/>
-              </a:defRPr>
-            </a:lvl2pPr>
-            <a:lvl3pPr marL="1371600" marR="0" lvl="2" indent="-317500" algn="ctr" rtl="0">
-              <a:lnSpc>
-                <a:spcPct val="100000"/>
-              </a:lnSpc>
-              <a:spcBef>
-                <a:spcPts val="0"/>
-              </a:spcBef>
-              <a:spcAft>
-                <a:spcPts val="0"/>
-              </a:spcAft>
-              <a:buClr>
-                <a:schemeClr val="dk2"/>
-              </a:buClr>
-              <a:buSzPts val="2800"/>
-              <a:buFont typeface="Arial"/>
-              <a:buNone/>
-              <a:defRPr sz="2800" b="0" i="0" u="none" strike="noStrike" cap="none">
-                <a:solidFill>
-                  <a:schemeClr val="dk2"/>
-                </a:solidFill>
-                <a:latin typeface="Arial"/>
-                <a:ea typeface="Arial"/>
-                <a:cs typeface="Arial"/>
-                <a:sym typeface="Arial"/>
-              </a:defRPr>
-            </a:lvl3pPr>
-            <a:lvl4pPr marL="1828800" marR="0" lvl="3" indent="-317500" algn="ctr" rtl="0">
-              <a:lnSpc>
-                <a:spcPct val="100000"/>
-              </a:lnSpc>
-              <a:spcBef>
-                <a:spcPts val="0"/>
-              </a:spcBef>
-              <a:spcAft>
-                <a:spcPts val="0"/>
-              </a:spcAft>
-              <a:buClr>
-                <a:schemeClr val="dk2"/>
-              </a:buClr>
-              <a:buSzPts val="2800"/>
-              <a:buFont typeface="Arial"/>
-              <a:buNone/>
-              <a:defRPr sz="2800" b="0" i="0" u="none" strike="noStrike" cap="none">
-                <a:solidFill>
-                  <a:schemeClr val="dk2"/>
-                </a:solidFill>
-                <a:latin typeface="Arial"/>
-                <a:ea typeface="Arial"/>
-                <a:cs typeface="Arial"/>
-                <a:sym typeface="Arial"/>
-              </a:defRPr>
-            </a:lvl4pPr>
-            <a:lvl5pPr marL="2286000" marR="0" lvl="4" indent="-317500" algn="ctr" rtl="0">
-              <a:lnSpc>
-                <a:spcPct val="100000"/>
-              </a:lnSpc>
-              <a:spcBef>
-                <a:spcPts val="0"/>
-              </a:spcBef>
-              <a:spcAft>
-                <a:spcPts val="0"/>
-              </a:spcAft>
-              <a:buClr>
-                <a:schemeClr val="dk2"/>
-              </a:buClr>
-              <a:buSzPts val="2800"/>
-              <a:buFont typeface="Arial"/>
-              <a:buNone/>
-              <a:defRPr sz="2800" b="0" i="0" u="none" strike="noStrike" cap="none">
-                <a:solidFill>
-                  <a:schemeClr val="dk2"/>
-                </a:solidFill>
-                <a:latin typeface="Arial"/>
-                <a:ea typeface="Arial"/>
-                <a:cs typeface="Arial"/>
-                <a:sym typeface="Arial"/>
-              </a:defRPr>
-            </a:lvl5pPr>
-            <a:lvl6pPr marL="2743200" marR="0" lvl="5" indent="-317500" algn="ctr" rtl="0">
-              <a:lnSpc>
-                <a:spcPct val="100000"/>
-              </a:lnSpc>
-              <a:spcBef>
-                <a:spcPts val="0"/>
-              </a:spcBef>
-              <a:spcAft>
-                <a:spcPts val="0"/>
-              </a:spcAft>
-              <a:buClr>
-                <a:schemeClr val="dk2"/>
-              </a:buClr>
-              <a:buSzPts val="2800"/>
-              <a:buFont typeface="Arial"/>
-              <a:buNone/>
-              <a:defRPr sz="2800" b="0" i="0" u="none" strike="noStrike" cap="none">
-                <a:solidFill>
-                  <a:schemeClr val="dk2"/>
-                </a:solidFill>
-                <a:latin typeface="Arial"/>
-                <a:ea typeface="Arial"/>
-                <a:cs typeface="Arial"/>
-                <a:sym typeface="Arial"/>
-              </a:defRPr>
-            </a:lvl6pPr>
-            <a:lvl7pPr marL="3200400" marR="0" lvl="6" indent="-317500" algn="ctr" rtl="0">
-              <a:lnSpc>
-                <a:spcPct val="100000"/>
-              </a:lnSpc>
-              <a:spcBef>
-                <a:spcPts val="0"/>
-              </a:spcBef>
-              <a:spcAft>
-                <a:spcPts val="0"/>
-              </a:spcAft>
-              <a:buClr>
-                <a:schemeClr val="dk2"/>
-              </a:buClr>
-              <a:buSzPts val="2800"/>
-              <a:buFont typeface="Arial"/>
-              <a:buNone/>
-              <a:defRPr sz="2800" b="0" i="0" u="none" strike="noStrike" cap="none">
-                <a:solidFill>
-                  <a:schemeClr val="dk2"/>
-                </a:solidFill>
-                <a:latin typeface="Arial"/>
-                <a:ea typeface="Arial"/>
-                <a:cs typeface="Arial"/>
-                <a:sym typeface="Arial"/>
-              </a:defRPr>
-            </a:lvl7pPr>
-            <a:lvl8pPr marL="3657600" marR="0" lvl="7" indent="-317500" algn="ctr" rtl="0">
-              <a:lnSpc>
-                <a:spcPct val="100000"/>
-              </a:lnSpc>
-              <a:spcBef>
-                <a:spcPts val="0"/>
-              </a:spcBef>
-              <a:spcAft>
-                <a:spcPts val="0"/>
-              </a:spcAft>
-              <a:buClr>
-                <a:schemeClr val="dk2"/>
-              </a:buClr>
-              <a:buSzPts val="2800"/>
-              <a:buFont typeface="Arial"/>
-              <a:buNone/>
-              <a:defRPr sz="2800" b="0" i="0" u="none" strike="noStrike" cap="none">
-                <a:solidFill>
-                  <a:schemeClr val="dk2"/>
-                </a:solidFill>
-                <a:latin typeface="Arial"/>
-                <a:ea typeface="Arial"/>
-                <a:cs typeface="Arial"/>
-                <a:sym typeface="Arial"/>
-              </a:defRPr>
-            </a:lvl8pPr>
-            <a:lvl9pPr marL="4114800" marR="0" lvl="8" indent="-317500" algn="ctr" rtl="0">
-              <a:lnSpc>
-                <a:spcPct val="100000"/>
-              </a:lnSpc>
-              <a:spcBef>
-                <a:spcPts val="0"/>
-              </a:spcBef>
-              <a:spcAft>
-                <a:spcPts val="0"/>
-              </a:spcAft>
-              <a:buClr>
-                <a:schemeClr val="dk2"/>
-              </a:buClr>
-              <a:buSzPts val="2800"/>
-              <a:buFont typeface="Arial"/>
-              <a:buNone/>
-              <a:defRPr sz="2800" b="0" i="0" u="none" strike="noStrike" cap="none">
-                <a:solidFill>
-                  <a:schemeClr val="dk2"/>
-                </a:solidFill>
-                <a:latin typeface="Arial"/>
-                <a:ea typeface="Arial"/>
-                <a:cs typeface="Arial"/>
-                <a:sym typeface="Arial"/>
-              </a:defRPr>
-            </a:lvl9pPr>
-          </a:lstStyle>
-          <a:p>
-            <a:pPr marL="673086" indent="-457200" algn="l">
-              <a:lnSpc>
-                <a:spcPct val="150000"/>
-              </a:lnSpc>
-              <a:buClr>
-                <a:srgbClr val="073763"/>
-              </a:buClr>
-              <a:buSzPts val="2400"/>
-              <a:buFont typeface="Arial" panose="020B0604020202020204" pitchFamily="34" charset="0"/>
-              <a:buChar char="•"/>
-            </a:pPr>
-            <a:r>
-              <a:rPr lang="pt-BR" sz="2400" dirty="0">
-                <a:solidFill>
-                  <a:srgbClr val="073763"/>
-                </a:solidFill>
-                <a:latin typeface="Century Gothic" panose="020B0502020202020204" pitchFamily="34" charset="0"/>
-                <a:sym typeface="Proxima Nova"/>
-              </a:rPr>
-              <a:t>Programação reativa</a:t>
-            </a:r>
-          </a:p>
-          <a:p>
-            <a:pPr marL="1130286" lvl="1" indent="-457200" algn="l">
-              <a:lnSpc>
-                <a:spcPct val="150000"/>
-              </a:lnSpc>
-              <a:buClr>
-                <a:srgbClr val="073763"/>
-              </a:buClr>
-              <a:buSzPts val="2400"/>
-              <a:buFont typeface="Arial" panose="020B0604020202020204" pitchFamily="34" charset="0"/>
-              <a:buChar char="•"/>
-            </a:pPr>
-            <a:r>
-              <a:rPr lang="pt-BR" sz="2400" dirty="0">
-                <a:solidFill>
-                  <a:srgbClr val="073763"/>
-                </a:solidFill>
-                <a:latin typeface="Century Gothic" panose="020B0502020202020204" pitchFamily="34" charset="0"/>
-                <a:sym typeface="Proxima Nova"/>
-              </a:rPr>
-              <a:t>Programas Assíncronos </a:t>
-            </a:r>
-          </a:p>
-          <a:p>
-            <a:pPr marL="1130286" lvl="1" indent="-457200" algn="l">
-              <a:lnSpc>
-                <a:spcPct val="150000"/>
-              </a:lnSpc>
-              <a:buClr>
-                <a:srgbClr val="073763"/>
-              </a:buClr>
-              <a:buSzPts val="2400"/>
-              <a:buFont typeface="Arial" panose="020B0604020202020204" pitchFamily="34" charset="0"/>
-              <a:buChar char="•"/>
-            </a:pPr>
-            <a:r>
-              <a:rPr lang="pt-BR" sz="2400" dirty="0">
-                <a:solidFill>
-                  <a:srgbClr val="073763"/>
-                </a:solidFill>
-                <a:latin typeface="Century Gothic" panose="020B0502020202020204" pitchFamily="34" charset="0"/>
-                <a:sym typeface="Proxima Nova"/>
-              </a:rPr>
-              <a:t>Programas orientados a Eventos</a:t>
-            </a:r>
-          </a:p>
-          <a:p>
-            <a:pPr marL="673086" indent="-457200" algn="l">
-              <a:buClr>
-                <a:srgbClr val="073763"/>
-              </a:buClr>
-              <a:buSzPts val="2400"/>
-              <a:buFont typeface="Arial" panose="020B0604020202020204" pitchFamily="34" charset="0"/>
-              <a:buChar char="•"/>
-            </a:pPr>
-            <a:endParaRPr lang="en-US" sz="2400" dirty="0">
-              <a:solidFill>
-                <a:srgbClr val="073763"/>
-              </a:solidFill>
-              <a:latin typeface="Century Gothic" panose="020B0502020202020204" pitchFamily="34" charset="0"/>
-              <a:sym typeface="Proxima Nova"/>
-            </a:endParaRPr>
-          </a:p>
-        </p:txBody>
-      </p:sp>
-      <p:pic>
-        <p:nvPicPr>
-          <p:cNvPr id="3" name="Imagem 2">
-            <a:extLst>
-              <a:ext uri="{FF2B5EF4-FFF2-40B4-BE49-F238E27FC236}">
-                <a16:creationId xmlns:a16="http://schemas.microsoft.com/office/drawing/2014/main" id="{8C08A883-8871-824D-9741-3C452A8390EF}"/>
-              </a:ext>
-            </a:extLst>
-          </p:cNvPr>
-          <p:cNvPicPr>
-            <a:picLocks noChangeAspect="1"/>
-          </p:cNvPicPr>
-          <p:nvPr/>
-        </p:nvPicPr>
-        <p:blipFill>
-          <a:blip r:embed="rId2"/>
-          <a:stretch>
-            <a:fillRect/>
-          </a:stretch>
-        </p:blipFill>
-        <p:spPr>
-          <a:xfrm>
-            <a:off x="7058419" y="1192858"/>
-            <a:ext cx="4981847" cy="3429000"/>
-          </a:xfrm>
-          <a:prstGeom prst="rect">
-            <a:avLst/>
-          </a:prstGeom>
-        </p:spPr>
-      </p:pic>
-      <p:pic>
-        <p:nvPicPr>
-          <p:cNvPr id="5" name="Imagem 4">
-            <a:extLst>
-              <a:ext uri="{FF2B5EF4-FFF2-40B4-BE49-F238E27FC236}">
-                <a16:creationId xmlns:a16="http://schemas.microsoft.com/office/drawing/2014/main" id="{14B2FA5E-596C-3D40-9E59-78FD39EF82C2}"/>
-              </a:ext>
-            </a:extLst>
-          </p:cNvPr>
-          <p:cNvPicPr>
-            <a:picLocks noChangeAspect="1"/>
-          </p:cNvPicPr>
-          <p:nvPr/>
-        </p:nvPicPr>
-        <p:blipFill rotWithShape="1">
-          <a:blip r:embed="rId3"/>
-          <a:srcRect t="24209" r="37714"/>
-          <a:stretch/>
-        </p:blipFill>
-        <p:spPr>
-          <a:xfrm>
-            <a:off x="872439" y="4621858"/>
-            <a:ext cx="1298812" cy="1045724"/>
-          </a:xfrm>
-          <a:prstGeom prst="rect">
-            <a:avLst/>
-          </a:prstGeom>
-        </p:spPr>
-      </p:pic>
-      <p:grpSp>
-        <p:nvGrpSpPr>
-          <p:cNvPr id="28" name="Agrupar 27">
-            <a:extLst>
-              <a:ext uri="{FF2B5EF4-FFF2-40B4-BE49-F238E27FC236}">
-                <a16:creationId xmlns:a16="http://schemas.microsoft.com/office/drawing/2014/main" id="{FBDC0FD2-2E22-AF41-9B93-3C787EF8B08A}"/>
-              </a:ext>
-            </a:extLst>
-          </p:cNvPr>
-          <p:cNvGrpSpPr/>
-          <p:nvPr/>
-        </p:nvGrpSpPr>
-        <p:grpSpPr>
-          <a:xfrm>
-            <a:off x="2078182" y="3856508"/>
-            <a:ext cx="1674421" cy="2668392"/>
-            <a:chOff x="2078182" y="3856508"/>
-            <a:chExt cx="1674421" cy="2668392"/>
-          </a:xfrm>
-        </p:grpSpPr>
-        <p:pic>
-          <p:nvPicPr>
-            <p:cNvPr id="19" name="Imagem 18">
-              <a:extLst>
-                <a:ext uri="{FF2B5EF4-FFF2-40B4-BE49-F238E27FC236}">
-                  <a16:creationId xmlns:a16="http://schemas.microsoft.com/office/drawing/2014/main" id="{C602E7E9-4DE7-274F-A841-69F6A725B403}"/>
-                </a:ext>
-              </a:extLst>
-            </p:cNvPr>
-            <p:cNvPicPr>
-              <a:picLocks noChangeAspect="1"/>
-            </p:cNvPicPr>
-            <p:nvPr/>
-          </p:nvPicPr>
-          <p:blipFill rotWithShape="1">
-            <a:blip r:embed="rId3"/>
-            <a:srcRect l="61048" t="25586" r="-4114" b="-1377"/>
-            <a:stretch/>
-          </p:blipFill>
-          <p:spPr>
-            <a:xfrm>
-              <a:off x="3133167" y="3856508"/>
-              <a:ext cx="619436" cy="721308"/>
-            </a:xfrm>
-            <a:prstGeom prst="rect">
-              <a:avLst/>
-            </a:prstGeom>
-          </p:spPr>
-        </p:pic>
-        <p:pic>
-          <p:nvPicPr>
-            <p:cNvPr id="20" name="Imagem 19">
-              <a:extLst>
-                <a:ext uri="{FF2B5EF4-FFF2-40B4-BE49-F238E27FC236}">
-                  <a16:creationId xmlns:a16="http://schemas.microsoft.com/office/drawing/2014/main" id="{E500B795-A84D-D74D-A265-A436DD3389B1}"/>
-                </a:ext>
-              </a:extLst>
-            </p:cNvPr>
-            <p:cNvPicPr>
-              <a:picLocks noChangeAspect="1"/>
-            </p:cNvPicPr>
-            <p:nvPr/>
-          </p:nvPicPr>
-          <p:blipFill rotWithShape="1">
-            <a:blip r:embed="rId3"/>
-            <a:srcRect l="61048" t="25586" r="-4114" b="-1377"/>
-            <a:stretch/>
-          </p:blipFill>
-          <p:spPr>
-            <a:xfrm>
-              <a:off x="3133167" y="4830050"/>
-              <a:ext cx="619436" cy="721308"/>
-            </a:xfrm>
-            <a:prstGeom prst="rect">
-              <a:avLst/>
-            </a:prstGeom>
-          </p:spPr>
-        </p:pic>
-        <p:pic>
-          <p:nvPicPr>
-            <p:cNvPr id="21" name="Imagem 20">
-              <a:extLst>
-                <a:ext uri="{FF2B5EF4-FFF2-40B4-BE49-F238E27FC236}">
-                  <a16:creationId xmlns:a16="http://schemas.microsoft.com/office/drawing/2014/main" id="{4CDC9A37-EE65-C342-BC2E-5957747C01F0}"/>
-                </a:ext>
-              </a:extLst>
-            </p:cNvPr>
-            <p:cNvPicPr>
-              <a:picLocks noChangeAspect="1"/>
-            </p:cNvPicPr>
-            <p:nvPr/>
-          </p:nvPicPr>
-          <p:blipFill rotWithShape="1">
-            <a:blip r:embed="rId3"/>
-            <a:srcRect l="61048" t="25586" r="-4114" b="-1377"/>
-            <a:stretch/>
-          </p:blipFill>
-          <p:spPr>
-            <a:xfrm>
-              <a:off x="3133167" y="5803592"/>
-              <a:ext cx="619436" cy="721308"/>
-            </a:xfrm>
-            <a:prstGeom prst="rect">
-              <a:avLst/>
-            </a:prstGeom>
-          </p:spPr>
-        </p:pic>
-        <p:cxnSp>
-          <p:nvCxnSpPr>
-            <p:cNvPr id="7" name="Conector de Seta Reta 6">
-              <a:extLst>
-                <a:ext uri="{FF2B5EF4-FFF2-40B4-BE49-F238E27FC236}">
-                  <a16:creationId xmlns:a16="http://schemas.microsoft.com/office/drawing/2014/main" id="{58157005-1B0C-6442-9CD2-723E6EFC7102}"/>
-                </a:ext>
-              </a:extLst>
-            </p:cNvPr>
-            <p:cNvCxnSpPr>
-              <a:cxnSpLocks/>
-            </p:cNvCxnSpPr>
-            <p:nvPr/>
-          </p:nvCxnSpPr>
-          <p:spPr>
-            <a:xfrm flipV="1">
-              <a:off x="2124717" y="4494358"/>
-              <a:ext cx="760987" cy="365315"/>
-            </a:xfrm>
-            <a:prstGeom prst="straightConnector1">
-              <a:avLst/>
-            </a:prstGeom>
-            <a:ln>
-              <a:tailEnd type="triangle"/>
-            </a:ln>
-          </p:spPr>
-          <p:style>
-            <a:lnRef idx="1">
-              <a:schemeClr val="accent1"/>
-            </a:lnRef>
-            <a:fillRef idx="0">
-              <a:schemeClr val="accent1"/>
-            </a:fillRef>
-            <a:effectRef idx="0">
-              <a:schemeClr val="accent1"/>
-            </a:effectRef>
-            <a:fontRef idx="minor">
-              <a:schemeClr val="tx1"/>
-            </a:fontRef>
-          </p:style>
-        </p:cxnSp>
-        <p:cxnSp>
-          <p:nvCxnSpPr>
-            <p:cNvPr id="24" name="Conector de Seta Reta 23">
-              <a:extLst>
-                <a:ext uri="{FF2B5EF4-FFF2-40B4-BE49-F238E27FC236}">
-                  <a16:creationId xmlns:a16="http://schemas.microsoft.com/office/drawing/2014/main" id="{78E5166F-5EDB-DD4B-95F7-250AD431B471}"/>
-                </a:ext>
-              </a:extLst>
-            </p:cNvPr>
-            <p:cNvCxnSpPr>
-              <a:cxnSpLocks/>
-            </p:cNvCxnSpPr>
-            <p:nvPr/>
-          </p:nvCxnSpPr>
-          <p:spPr>
-            <a:xfrm flipV="1">
-              <a:off x="2171251" y="5190704"/>
-              <a:ext cx="809455" cy="2"/>
-            </a:xfrm>
-            <a:prstGeom prst="straightConnector1">
-              <a:avLst/>
-            </a:prstGeom>
-            <a:ln>
-              <a:tailEnd type="triangle"/>
-            </a:ln>
-          </p:spPr>
-          <p:style>
-            <a:lnRef idx="1">
-              <a:schemeClr val="accent1"/>
-            </a:lnRef>
-            <a:fillRef idx="0">
-              <a:schemeClr val="accent1"/>
-            </a:fillRef>
-            <a:effectRef idx="0">
-              <a:schemeClr val="accent1"/>
-            </a:effectRef>
-            <a:fontRef idx="minor">
-              <a:schemeClr val="tx1"/>
-            </a:fontRef>
-          </p:style>
-        </p:cxnSp>
-        <p:cxnSp>
-          <p:nvCxnSpPr>
-            <p:cNvPr id="27" name="Conector de Seta Reta 26">
-              <a:extLst>
-                <a:ext uri="{FF2B5EF4-FFF2-40B4-BE49-F238E27FC236}">
-                  <a16:creationId xmlns:a16="http://schemas.microsoft.com/office/drawing/2014/main" id="{7A9C2658-EE89-5D4D-B10E-6443181A5359}"/>
-                </a:ext>
-              </a:extLst>
-            </p:cNvPr>
-            <p:cNvCxnSpPr>
-              <a:cxnSpLocks/>
-            </p:cNvCxnSpPr>
-            <p:nvPr/>
-          </p:nvCxnSpPr>
-          <p:spPr>
-            <a:xfrm>
-              <a:off x="2078182" y="5489372"/>
-              <a:ext cx="902524" cy="465574"/>
-            </a:xfrm>
-            <a:prstGeom prst="straightConnector1">
-              <a:avLst/>
-            </a:prstGeom>
-            <a:ln>
-              <a:tailEnd type="triangle"/>
-            </a:ln>
-          </p:spPr>
-          <p:style>
-            <a:lnRef idx="1">
-              <a:schemeClr val="accent1"/>
-            </a:lnRef>
-            <a:fillRef idx="0">
-              <a:schemeClr val="accent1"/>
-            </a:fillRef>
-            <a:effectRef idx="0">
-              <a:schemeClr val="accent1"/>
-            </a:effectRef>
-            <a:fontRef idx="minor">
-              <a:schemeClr val="tx1"/>
-            </a:fontRef>
-          </p:style>
-        </p:cxnSp>
-      </p:grpSp>
-      <p:grpSp>
-        <p:nvGrpSpPr>
-          <p:cNvPr id="29" name="Agrupar 28">
-            <a:extLst>
-              <a:ext uri="{FF2B5EF4-FFF2-40B4-BE49-F238E27FC236}">
-                <a16:creationId xmlns:a16="http://schemas.microsoft.com/office/drawing/2014/main" id="{4B195989-B442-4546-9787-53A0C793D0D0}"/>
-              </a:ext>
-            </a:extLst>
-          </p:cNvPr>
-          <p:cNvGrpSpPr/>
-          <p:nvPr/>
-        </p:nvGrpSpPr>
-        <p:grpSpPr>
-          <a:xfrm>
-            <a:off x="4049486" y="4000375"/>
-            <a:ext cx="1990870" cy="2290939"/>
-            <a:chOff x="4049486" y="4000375"/>
-            <a:chExt cx="1990870" cy="2290939"/>
-          </a:xfrm>
-        </p:grpSpPr>
-        <p:cxnSp>
-          <p:nvCxnSpPr>
-            <p:cNvPr id="22" name="Conector de Seta Reta 21">
-              <a:extLst>
-                <a:ext uri="{FF2B5EF4-FFF2-40B4-BE49-F238E27FC236}">
-                  <a16:creationId xmlns:a16="http://schemas.microsoft.com/office/drawing/2014/main" id="{9345315C-45A7-CD49-83F5-2A93200B1D1C}"/>
-                </a:ext>
-              </a:extLst>
-            </p:cNvPr>
-            <p:cNvCxnSpPr/>
-            <p:nvPr/>
-          </p:nvCxnSpPr>
-          <p:spPr>
-            <a:xfrm>
-              <a:off x="4049486" y="4217162"/>
-              <a:ext cx="1258784" cy="0"/>
-            </a:xfrm>
-            <a:prstGeom prst="straightConnector1">
-              <a:avLst/>
-            </a:prstGeom>
-            <a:ln>
-              <a:tailEnd type="triangle"/>
-            </a:ln>
-          </p:spPr>
-          <p:style>
-            <a:lnRef idx="1">
-              <a:schemeClr val="accent1"/>
-            </a:lnRef>
-            <a:fillRef idx="0">
-              <a:schemeClr val="accent1"/>
-            </a:fillRef>
-            <a:effectRef idx="0">
-              <a:schemeClr val="accent1"/>
-            </a:effectRef>
-            <a:fontRef idx="minor">
-              <a:schemeClr val="tx1"/>
-            </a:fontRef>
-          </p:style>
-        </p:cxnSp>
-        <p:cxnSp>
-          <p:nvCxnSpPr>
-            <p:cNvPr id="35" name="Conector de Seta Reta 34">
-              <a:extLst>
-                <a:ext uri="{FF2B5EF4-FFF2-40B4-BE49-F238E27FC236}">
-                  <a16:creationId xmlns:a16="http://schemas.microsoft.com/office/drawing/2014/main" id="{BF4AFC56-5DE1-D34E-962E-F2C720569485}"/>
-                </a:ext>
-              </a:extLst>
-            </p:cNvPr>
-            <p:cNvCxnSpPr/>
-            <p:nvPr/>
-          </p:nvCxnSpPr>
-          <p:spPr>
-            <a:xfrm>
-              <a:off x="4049486" y="5167913"/>
-              <a:ext cx="1258784" cy="0"/>
-            </a:xfrm>
-            <a:prstGeom prst="straightConnector1">
-              <a:avLst/>
-            </a:prstGeom>
-            <a:ln>
-              <a:tailEnd type="triangle"/>
-            </a:ln>
-          </p:spPr>
-          <p:style>
-            <a:lnRef idx="1">
-              <a:schemeClr val="accent1"/>
-            </a:lnRef>
-            <a:fillRef idx="0">
-              <a:schemeClr val="accent1"/>
-            </a:fillRef>
-            <a:effectRef idx="0">
-              <a:schemeClr val="accent1"/>
-            </a:effectRef>
-            <a:fontRef idx="minor">
-              <a:schemeClr val="tx1"/>
-            </a:fontRef>
-          </p:style>
-        </p:cxnSp>
-        <p:cxnSp>
-          <p:nvCxnSpPr>
-            <p:cNvPr id="36" name="Conector de Seta Reta 35">
-              <a:extLst>
-                <a:ext uri="{FF2B5EF4-FFF2-40B4-BE49-F238E27FC236}">
-                  <a16:creationId xmlns:a16="http://schemas.microsoft.com/office/drawing/2014/main" id="{4708DBD7-2237-1149-8A94-D74F85F660E7}"/>
-                </a:ext>
-              </a:extLst>
-            </p:cNvPr>
-            <p:cNvCxnSpPr/>
-            <p:nvPr/>
-          </p:nvCxnSpPr>
-          <p:spPr>
-            <a:xfrm>
-              <a:off x="4049486" y="6164414"/>
-              <a:ext cx="1258784" cy="0"/>
-            </a:xfrm>
-            <a:prstGeom prst="straightConnector1">
-              <a:avLst/>
-            </a:prstGeom>
-            <a:ln>
-              <a:tailEnd type="triangle"/>
-            </a:ln>
-          </p:spPr>
-          <p:style>
-            <a:lnRef idx="1">
-              <a:schemeClr val="accent1"/>
-            </a:lnRef>
-            <a:fillRef idx="0">
-              <a:schemeClr val="accent1"/>
-            </a:fillRef>
-            <a:effectRef idx="0">
-              <a:schemeClr val="accent1"/>
-            </a:effectRef>
-            <a:fontRef idx="minor">
-              <a:schemeClr val="tx1"/>
-            </a:fontRef>
-          </p:style>
-        </p:cxnSp>
-        <p:sp>
-          <p:nvSpPr>
-            <p:cNvPr id="23" name="CaixaDeTexto 22">
-              <a:extLst>
-                <a:ext uri="{FF2B5EF4-FFF2-40B4-BE49-F238E27FC236}">
-                  <a16:creationId xmlns:a16="http://schemas.microsoft.com/office/drawing/2014/main" id="{03D0802F-E9C3-E047-991A-49C943F5993F}"/>
-                </a:ext>
-              </a:extLst>
-            </p:cNvPr>
-            <p:cNvSpPr txBox="1"/>
-            <p:nvPr/>
-          </p:nvSpPr>
-          <p:spPr>
-            <a:xfrm>
-              <a:off x="5416787" y="4000375"/>
-              <a:ext cx="623569" cy="369332"/>
-            </a:xfrm>
-            <a:prstGeom prst="rect">
-              <a:avLst/>
-            </a:prstGeom>
-            <a:noFill/>
-          </p:spPr>
-          <p:txBody>
-            <a:bodyPr wrap="none" rtlCol="0">
-              <a:spAutoFit/>
-            </a:bodyPr>
-            <a:lstStyle/>
-            <a:p>
-              <a:r>
-                <a:rPr lang="pt-BR" dirty="0"/>
-                <a:t>ação</a:t>
-              </a:r>
-            </a:p>
-          </p:txBody>
-        </p:sp>
-        <p:sp>
-          <p:nvSpPr>
-            <p:cNvPr id="38" name="CaixaDeTexto 37">
-              <a:extLst>
-                <a:ext uri="{FF2B5EF4-FFF2-40B4-BE49-F238E27FC236}">
-                  <a16:creationId xmlns:a16="http://schemas.microsoft.com/office/drawing/2014/main" id="{2EFDD62B-F72E-E748-A245-7C5B935DB608}"/>
-                </a:ext>
-              </a:extLst>
-            </p:cNvPr>
-            <p:cNvSpPr txBox="1"/>
-            <p:nvPr/>
-          </p:nvSpPr>
-          <p:spPr>
-            <a:xfrm>
-              <a:off x="5416787" y="4960054"/>
-              <a:ext cx="623569" cy="369332"/>
-            </a:xfrm>
-            <a:prstGeom prst="rect">
-              <a:avLst/>
-            </a:prstGeom>
-            <a:noFill/>
-          </p:spPr>
-          <p:txBody>
-            <a:bodyPr wrap="none" rtlCol="0">
-              <a:spAutoFit/>
-            </a:bodyPr>
-            <a:lstStyle/>
-            <a:p>
-              <a:r>
-                <a:rPr lang="pt-BR" dirty="0"/>
-                <a:t>ação</a:t>
-              </a:r>
-            </a:p>
-          </p:txBody>
-        </p:sp>
-        <p:sp>
-          <p:nvSpPr>
-            <p:cNvPr id="39" name="CaixaDeTexto 38">
-              <a:extLst>
-                <a:ext uri="{FF2B5EF4-FFF2-40B4-BE49-F238E27FC236}">
-                  <a16:creationId xmlns:a16="http://schemas.microsoft.com/office/drawing/2014/main" id="{6979F20E-B79E-8B4A-AD0E-D6007E604F33}"/>
-                </a:ext>
-              </a:extLst>
-            </p:cNvPr>
-            <p:cNvSpPr txBox="1"/>
-            <p:nvPr/>
-          </p:nvSpPr>
-          <p:spPr>
-            <a:xfrm>
-              <a:off x="5416786" y="5921982"/>
-              <a:ext cx="623569" cy="369332"/>
-            </a:xfrm>
-            <a:prstGeom prst="rect">
-              <a:avLst/>
-            </a:prstGeom>
-            <a:noFill/>
-          </p:spPr>
-          <p:txBody>
-            <a:bodyPr wrap="none" rtlCol="0">
-              <a:spAutoFit/>
-            </a:bodyPr>
-            <a:lstStyle/>
-            <a:p>
-              <a:r>
-                <a:rPr lang="pt-BR" dirty="0"/>
-                <a:t>ação</a:t>
-              </a:r>
-            </a:p>
-          </p:txBody>
-        </p:sp>
-      </p:grpSp>
-    </p:spTree>
-    <p:extLst>
-      <p:ext uri="{BB962C8B-B14F-4D97-AF65-F5344CB8AC3E}">
-        <p14:creationId xmlns:p14="http://schemas.microsoft.com/office/powerpoint/2010/main" val="1535017772"/>
-      </p:ext>
-    </p:extLst>
-  </p:cSld>
-  <p:clrMapOvr>
-    <a:masterClrMapping/>
-  </p:clrMapOvr>
-  <mc:AlternateContent xmlns:mc="http://schemas.openxmlformats.org/markup-compatibility/2006">
-    <mc:Choice xmlns:p14="http://schemas.microsoft.com/office/powerpoint/2010/main" Requires="p14">
-      <p:transition spd="med" p14:dur="700">
-        <p:fade/>
-      </p:transition>
-    </mc:Choice>
-    <mc:Fallback>
-      <p:transition spd="med">
-        <p:fade/>
-      </p:transition>
-    </mc:Fallback>
-  </mc:AlternateContent>
-  <p:timing>
-    <p:tnLst>
-      <p:par>
-        <p:cTn id="1" dur="indefinite" restart="never" nodeType="tmRoot">
-          <p:childTnLst>
-            <p:seq concurrent="1" nextAc="seek">
-              <p:cTn id="2" dur="indefinite" nodeType="mainSeq">
-                <p:childTnLst>
-                  <p:par>
-                    <p:cTn id="3" fill="hold">
-                      <p:stCondLst>
-                        <p:cond delay="indefinite"/>
-                      </p:stCondLst>
-                      <p:childTnLst>
-                        <p:par>
-                          <p:cTn id="4" fill="hold">
-                            <p:stCondLst>
-                              <p:cond delay="0"/>
-                            </p:stCondLst>
-                            <p:childTnLst>
-                              <p:par>
-                                <p:cTn id="5" presetID="22" presetClass="entr" presetSubtype="8" fill="hold" nodeType="clickEffect">
-                                  <p:stCondLst>
-                                    <p:cond delay="0"/>
-                                  </p:stCondLst>
-                                  <p:childTnLst>
-                                    <p:set>
-                                      <p:cBhvr>
-                                        <p:cTn id="6" dur="1" fill="hold">
-                                          <p:stCondLst>
-                                            <p:cond delay="0"/>
-                                          </p:stCondLst>
-                                        </p:cTn>
-                                        <p:tgtEl>
-                                          <p:spTgt spid="5"/>
-                                        </p:tgtEl>
-                                        <p:attrNameLst>
-                                          <p:attrName>style.visibility</p:attrName>
-                                        </p:attrNameLst>
-                                      </p:cBhvr>
-                                      <p:to>
-                                        <p:strVal val="visible"/>
-                                      </p:to>
-                                    </p:set>
-                                    <p:animEffect transition="in" filter="wipe(left)">
-                                      <p:cBhvr>
-                                        <p:cTn id="7" dur="500"/>
-                                        <p:tgtEl>
-                                          <p:spTgt spid="5"/>
-                                        </p:tgtEl>
-                                      </p:cBhvr>
-                                    </p:animEffect>
-                                  </p:childTnLst>
-                                </p:cTn>
-                              </p:par>
-                            </p:childTnLst>
-                          </p:cTn>
-                        </p:par>
-                      </p:childTnLst>
-                    </p:cTn>
-                  </p:par>
-                  <p:par>
-                    <p:cTn id="8" fill="hold">
-                      <p:stCondLst>
-                        <p:cond delay="indefinite"/>
-                      </p:stCondLst>
-                      <p:childTnLst>
-                        <p:par>
-                          <p:cTn id="9" fill="hold">
-                            <p:stCondLst>
-                              <p:cond delay="0"/>
-                            </p:stCondLst>
-                            <p:childTnLst>
-                              <p:par>
-                                <p:cTn id="10" presetID="22" presetClass="entr" presetSubtype="8" fill="hold" nodeType="clickEffect">
-                                  <p:stCondLst>
-                                    <p:cond delay="0"/>
-                                  </p:stCondLst>
-                                  <p:childTnLst>
-                                    <p:set>
-                                      <p:cBhvr>
-                                        <p:cTn id="11" dur="1" fill="hold">
-                                          <p:stCondLst>
-                                            <p:cond delay="0"/>
-                                          </p:stCondLst>
-                                        </p:cTn>
-                                        <p:tgtEl>
-                                          <p:spTgt spid="28"/>
-                                        </p:tgtEl>
-                                        <p:attrNameLst>
-                                          <p:attrName>style.visibility</p:attrName>
-                                        </p:attrNameLst>
-                                      </p:cBhvr>
-                                      <p:to>
-                                        <p:strVal val="visible"/>
-                                      </p:to>
-                                    </p:set>
-                                    <p:animEffect transition="in" filter="wipe(left)">
-                                      <p:cBhvr>
-                                        <p:cTn id="12" dur="500"/>
-                                        <p:tgtEl>
-                                          <p:spTgt spid="28"/>
-                                        </p:tgtEl>
-                                      </p:cBhvr>
-                                    </p:animEffect>
-                                  </p:childTnLst>
-                                </p:cTn>
-                              </p:par>
-                            </p:childTnLst>
-                          </p:cTn>
-                        </p:par>
-                      </p:childTnLst>
-                    </p:cTn>
-                  </p:par>
-                  <p:par>
-                    <p:cTn id="13" fill="hold">
-                      <p:stCondLst>
-                        <p:cond delay="indefinite"/>
-                      </p:stCondLst>
-                      <p:childTnLst>
-                        <p:par>
-                          <p:cTn id="14" fill="hold">
-                            <p:stCondLst>
-                              <p:cond delay="0"/>
-                            </p:stCondLst>
-                            <p:childTnLst>
-                              <p:par>
-                                <p:cTn id="15" presetID="22" presetClass="entr" presetSubtype="8" fill="hold" nodeType="clickEffect">
-                                  <p:stCondLst>
-                                    <p:cond delay="0"/>
-                                  </p:stCondLst>
-                                  <p:childTnLst>
-                                    <p:set>
-                                      <p:cBhvr>
-                                        <p:cTn id="16" dur="1" fill="hold">
-                                          <p:stCondLst>
-                                            <p:cond delay="0"/>
-                                          </p:stCondLst>
-                                        </p:cTn>
-                                        <p:tgtEl>
-                                          <p:spTgt spid="29"/>
-                                        </p:tgtEl>
-                                        <p:attrNameLst>
-                                          <p:attrName>style.visibility</p:attrName>
-                                        </p:attrNameLst>
-                                      </p:cBhvr>
-                                      <p:to>
-                                        <p:strVal val="visible"/>
-                                      </p:to>
-                                    </p:set>
-                                    <p:animEffect transition="in" filter="wipe(left)">
-                                      <p:cBhvr>
-                                        <p:cTn id="17" dur="500"/>
-                                        <p:tgtEl>
-                                          <p:spTgt spid="29"/>
-                                        </p:tgtEl>
-                                      </p:cBhvr>
-                                    </p:animEffect>
-                                  </p:childTnLst>
-                                </p:cTn>
-                              </p:par>
-                            </p:childTnLst>
-                          </p:cTn>
-                        </p:par>
-                      </p:childTnLst>
-                    </p:cTn>
-                  </p:par>
-                </p:childTnLst>
-              </p:cTn>
-              <p:prevCondLst>
-                <p:cond evt="onPrev" delay="0">
-                  <p:tgtEl>
-                    <p:sldTgt/>
-                  </p:tgtEl>
-                </p:cond>
-              </p:prevCondLst>
-              <p:nextCondLst>
-                <p:cond evt="onNext" delay="0">
-                  <p:tgtEl>
-                    <p:sldTgt/>
-                  </p:tgtEl>
-                </p:cond>
-              </p:nextCondLst>
-            </p:seq>
-          </p:childTnLst>
-        </p:cTn>
-      </p:par>
-    </p:tnLst>
-  </p:timing>
-</p:sld>
-</file>
-
-<file path=ppt/slides/slide23.xml><?xml version="1.0" encoding="utf-8"?>
-<p:sld xmlns:a="http://schemas.openxmlformats.org/drawingml/2006/main" xmlns:r="http://schemas.openxmlformats.org/officeDocument/2006/relationships" xmlns:p="http://schemas.openxmlformats.org/presentationml/2006/main">
-  <p:cSld>
-    <p:spTree>
-      <p:nvGrpSpPr>
         <p:cNvPr id="1" name="Shape 64"/>
         <p:cNvGrpSpPr/>
         <p:nvPr/>
@@ -21027,7 +18269,7 @@
 </p:sld>
 </file>
 
-<file path=ppt/slides/slide24.xml><?xml version="1.0" encoding="utf-8"?>
+<file path=ppt/slides/slide22.xml><?xml version="1.0" encoding="utf-8"?>
 <p:sld xmlns:a="http://schemas.openxmlformats.org/drawingml/2006/main" xmlns:r="http://schemas.openxmlformats.org/officeDocument/2006/relationships" xmlns:p="http://schemas.openxmlformats.org/presentationml/2006/main">
   <p:cSld>
     <p:spTree>
@@ -21845,7 +19087,7 @@
 </p:sld>
 </file>
 
-<file path=ppt/slides/slide25.xml><?xml version="1.0" encoding="utf-8"?>
+<file path=ppt/slides/slide23.xml><?xml version="1.0" encoding="utf-8"?>
 <p:sld xmlns:a="http://schemas.openxmlformats.org/drawingml/2006/main" xmlns:r="http://schemas.openxmlformats.org/officeDocument/2006/relationships" xmlns:p="http://schemas.openxmlformats.org/presentationml/2006/main">
   <p:cSld>
     <p:spTree>
@@ -23752,7 +20994,7 @@
 </p:sld>
 </file>
 
-<file path=ppt/slides/slide26.xml><?xml version="1.0" encoding="utf-8"?>
+<file path=ppt/slides/slide24.xml><?xml version="1.0" encoding="utf-8"?>
 <p:sld xmlns:a="http://schemas.openxmlformats.org/drawingml/2006/main" xmlns:r="http://schemas.openxmlformats.org/officeDocument/2006/relationships" xmlns:p="http://schemas.openxmlformats.org/presentationml/2006/main">
   <p:cSld>
     <p:spTree>
@@ -25424,1124 +22666,7 @@
 </p:sld>
 </file>
 
-<file path=ppt/slides/slide27.xml><?xml version="1.0" encoding="utf-8"?>
-<p:sld xmlns:a="http://schemas.openxmlformats.org/drawingml/2006/main" xmlns:r="http://schemas.openxmlformats.org/officeDocument/2006/relationships" xmlns:p="http://schemas.openxmlformats.org/presentationml/2006/main">
-  <p:cSld>
-    <p:spTree>
-      <p:nvGrpSpPr>
-        <p:cNvPr id="1" name=""/>
-        <p:cNvGrpSpPr/>
-        <p:nvPr/>
-      </p:nvGrpSpPr>
-      <p:grpSpPr>
-        <a:xfrm>
-          <a:off x="0" y="0"/>
-          <a:ext cx="0" cy="0"/>
-          <a:chOff x="0" y="0"/>
-          <a:chExt cx="0" cy="0"/>
-        </a:xfrm>
-      </p:grpSpPr>
-      <p:sp>
-        <p:nvSpPr>
-          <p:cNvPr id="33" name="Google Shape;65;p14">
-            <a:extLst>
-              <a:ext uri="{FF2B5EF4-FFF2-40B4-BE49-F238E27FC236}">
-                <a16:creationId xmlns:a16="http://schemas.microsoft.com/office/drawing/2014/main" id="{DF4086E1-372D-D74F-BBC4-07FED2D779A8}"/>
-              </a:ext>
-            </a:extLst>
-          </p:cNvPr>
-          <p:cNvSpPr txBox="1">
-            <a:spLocks/>
-          </p:cNvSpPr>
-          <p:nvPr/>
-        </p:nvSpPr>
-        <p:spPr>
-          <a:xfrm>
-            <a:off x="415600" y="918239"/>
-            <a:ext cx="11360800" cy="788400"/>
-          </a:xfrm>
-          <a:prstGeom prst="rect">
-            <a:avLst/>
-          </a:prstGeom>
-        </p:spPr>
-        <p:txBody>
-          <a:bodyPr spcFirstLastPara="1" vert="horz" wrap="square" lIns="121900" tIns="121900" rIns="121900" bIns="121900" rtlCol="0" anchor="ctr" anchorCtr="0">
-            <a:noAutofit/>
-          </a:bodyPr>
-          <a:lstStyle>
-            <a:lvl1pPr marL="228600" indent="-228600" algn="l" defTabSz="914400" rtl="0" eaLnBrk="1" latinLnBrk="0" hangingPunct="1">
-              <a:lnSpc>
-                <a:spcPct val="90000"/>
-              </a:lnSpc>
-              <a:spcBef>
-                <a:spcPts val="1000"/>
-              </a:spcBef>
-              <a:buFont typeface="Arial" panose="020B0604020202020204" pitchFamily="34" charset="0"/>
-              <a:buChar char="•"/>
-              <a:defRPr sz="2800" kern="1200">
-                <a:solidFill>
-                  <a:schemeClr val="tx1"/>
-                </a:solidFill>
-                <a:latin typeface="+mn-lt"/>
-                <a:ea typeface="+mn-ea"/>
-                <a:cs typeface="+mn-cs"/>
-              </a:defRPr>
-            </a:lvl1pPr>
-            <a:lvl2pPr marL="685800" indent="-228600" algn="l" defTabSz="914400" rtl="0" eaLnBrk="1" latinLnBrk="0" hangingPunct="1">
-              <a:lnSpc>
-                <a:spcPct val="90000"/>
-              </a:lnSpc>
-              <a:spcBef>
-                <a:spcPts val="500"/>
-              </a:spcBef>
-              <a:buFont typeface="Arial" panose="020B0604020202020204" pitchFamily="34" charset="0"/>
-              <a:buChar char="•"/>
-              <a:defRPr sz="2400" kern="1200">
-                <a:solidFill>
-                  <a:schemeClr val="tx1"/>
-                </a:solidFill>
-                <a:latin typeface="+mn-lt"/>
-                <a:ea typeface="+mn-ea"/>
-                <a:cs typeface="+mn-cs"/>
-              </a:defRPr>
-            </a:lvl2pPr>
-            <a:lvl3pPr marL="1143000" indent="-228600" algn="l" defTabSz="914400" rtl="0" eaLnBrk="1" latinLnBrk="0" hangingPunct="1">
-              <a:lnSpc>
-                <a:spcPct val="90000"/>
-              </a:lnSpc>
-              <a:spcBef>
-                <a:spcPts val="500"/>
-              </a:spcBef>
-              <a:buFont typeface="Arial" panose="020B0604020202020204" pitchFamily="34" charset="0"/>
-              <a:buChar char="•"/>
-              <a:defRPr sz="2000" kern="1200">
-                <a:solidFill>
-                  <a:schemeClr val="tx1"/>
-                </a:solidFill>
-                <a:latin typeface="+mn-lt"/>
-                <a:ea typeface="+mn-ea"/>
-                <a:cs typeface="+mn-cs"/>
-              </a:defRPr>
-            </a:lvl3pPr>
-            <a:lvl4pPr marL="1600200" indent="-228600" algn="l" defTabSz="914400" rtl="0" eaLnBrk="1" latinLnBrk="0" hangingPunct="1">
-              <a:lnSpc>
-                <a:spcPct val="90000"/>
-              </a:lnSpc>
-              <a:spcBef>
-                <a:spcPts val="500"/>
-              </a:spcBef>
-              <a:buFont typeface="Arial" panose="020B0604020202020204" pitchFamily="34" charset="0"/>
-              <a:buChar char="•"/>
-              <a:defRPr sz="1800" kern="1200">
-                <a:solidFill>
-                  <a:schemeClr val="tx1"/>
-                </a:solidFill>
-                <a:latin typeface="+mn-lt"/>
-                <a:ea typeface="+mn-ea"/>
-                <a:cs typeface="+mn-cs"/>
-              </a:defRPr>
-            </a:lvl4pPr>
-            <a:lvl5pPr marL="2057400" indent="-228600" algn="l" defTabSz="914400" rtl="0" eaLnBrk="1" latinLnBrk="0" hangingPunct="1">
-              <a:lnSpc>
-                <a:spcPct val="90000"/>
-              </a:lnSpc>
-              <a:spcBef>
-                <a:spcPts val="500"/>
-              </a:spcBef>
-              <a:buFont typeface="Arial" panose="020B0604020202020204" pitchFamily="34" charset="0"/>
-              <a:buChar char="•"/>
-              <a:defRPr sz="1800" kern="1200">
-                <a:solidFill>
-                  <a:schemeClr val="tx1"/>
-                </a:solidFill>
-                <a:latin typeface="+mn-lt"/>
-                <a:ea typeface="+mn-ea"/>
-                <a:cs typeface="+mn-cs"/>
-              </a:defRPr>
-            </a:lvl5pPr>
-            <a:lvl6pPr marL="2514600" indent="-228600" algn="l" defTabSz="914400" rtl="0" eaLnBrk="1" latinLnBrk="0" hangingPunct="1">
-              <a:lnSpc>
-                <a:spcPct val="90000"/>
-              </a:lnSpc>
-              <a:spcBef>
-                <a:spcPts val="500"/>
-              </a:spcBef>
-              <a:buFont typeface="Arial" panose="020B0604020202020204" pitchFamily="34" charset="0"/>
-              <a:buChar char="•"/>
-              <a:defRPr sz="1800" kern="1200">
-                <a:solidFill>
-                  <a:schemeClr val="tx1"/>
-                </a:solidFill>
-                <a:latin typeface="+mn-lt"/>
-                <a:ea typeface="+mn-ea"/>
-                <a:cs typeface="+mn-cs"/>
-              </a:defRPr>
-            </a:lvl6pPr>
-            <a:lvl7pPr marL="2971800" indent="-228600" algn="l" defTabSz="914400" rtl="0" eaLnBrk="1" latinLnBrk="0" hangingPunct="1">
-              <a:lnSpc>
-                <a:spcPct val="90000"/>
-              </a:lnSpc>
-              <a:spcBef>
-                <a:spcPts val="500"/>
-              </a:spcBef>
-              <a:buFont typeface="Arial" panose="020B0604020202020204" pitchFamily="34" charset="0"/>
-              <a:buChar char="•"/>
-              <a:defRPr sz="1800" kern="1200">
-                <a:solidFill>
-                  <a:schemeClr val="tx1"/>
-                </a:solidFill>
-                <a:latin typeface="+mn-lt"/>
-                <a:ea typeface="+mn-ea"/>
-                <a:cs typeface="+mn-cs"/>
-              </a:defRPr>
-            </a:lvl7pPr>
-            <a:lvl8pPr marL="3429000" indent="-228600" algn="l" defTabSz="914400" rtl="0" eaLnBrk="1" latinLnBrk="0" hangingPunct="1">
-              <a:lnSpc>
-                <a:spcPct val="90000"/>
-              </a:lnSpc>
-              <a:spcBef>
-                <a:spcPts val="500"/>
-              </a:spcBef>
-              <a:buFont typeface="Arial" panose="020B0604020202020204" pitchFamily="34" charset="0"/>
-              <a:buChar char="•"/>
-              <a:defRPr sz="1800" kern="1200">
-                <a:solidFill>
-                  <a:schemeClr val="tx1"/>
-                </a:solidFill>
-                <a:latin typeface="+mn-lt"/>
-                <a:ea typeface="+mn-ea"/>
-                <a:cs typeface="+mn-cs"/>
-              </a:defRPr>
-            </a:lvl8pPr>
-            <a:lvl9pPr marL="3886200" indent="-228600" algn="l" defTabSz="914400" rtl="0" eaLnBrk="1" latinLnBrk="0" hangingPunct="1">
-              <a:lnSpc>
-                <a:spcPct val="90000"/>
-              </a:lnSpc>
-              <a:spcBef>
-                <a:spcPts val="500"/>
-              </a:spcBef>
-              <a:buFont typeface="Arial" panose="020B0604020202020204" pitchFamily="34" charset="0"/>
-              <a:buChar char="•"/>
-              <a:defRPr sz="1800" kern="1200">
-                <a:solidFill>
-                  <a:schemeClr val="tx1"/>
-                </a:solidFill>
-                <a:latin typeface="+mn-lt"/>
-                <a:ea typeface="+mn-ea"/>
-                <a:cs typeface="+mn-cs"/>
-              </a:defRPr>
-            </a:lvl9pPr>
-          </a:lstStyle>
-          <a:p>
-            <a:pPr marL="0" indent="0">
-              <a:spcBef>
-                <a:spcPts val="0"/>
-              </a:spcBef>
-              <a:buClr>
-                <a:schemeClr val="dk1"/>
-              </a:buClr>
-              <a:buSzPts val="1100"/>
-              <a:buNone/>
-            </a:pPr>
-            <a:endParaRPr lang="pt-BR" sz="4000" b="1" dirty="0">
-              <a:solidFill>
-                <a:srgbClr val="073763"/>
-              </a:solidFill>
-              <a:latin typeface="Century Gothic" panose="020B0502020202020204" pitchFamily="34" charset="0"/>
-              <a:ea typeface="Proxima Nova"/>
-              <a:cs typeface="Proxima Nova"/>
-              <a:sym typeface="Proxima Nova"/>
-            </a:endParaRPr>
-          </a:p>
-        </p:txBody>
-      </p:sp>
-      <p:sp>
-        <p:nvSpPr>
-          <p:cNvPr id="43" name="Google Shape;74;p15">
-            <a:extLst>
-              <a:ext uri="{FF2B5EF4-FFF2-40B4-BE49-F238E27FC236}">
-                <a16:creationId xmlns:a16="http://schemas.microsoft.com/office/drawing/2014/main" id="{B735DC77-A126-C449-819D-30ED09B35CAB}"/>
-              </a:ext>
-            </a:extLst>
-          </p:cNvPr>
-          <p:cNvSpPr txBox="1">
-            <a:spLocks/>
-          </p:cNvSpPr>
-          <p:nvPr/>
-        </p:nvSpPr>
-        <p:spPr>
-          <a:xfrm>
-            <a:off x="311700" y="305700"/>
-            <a:ext cx="11360800" cy="975633"/>
-          </a:xfrm>
-          <a:prstGeom prst="rect">
-            <a:avLst/>
-          </a:prstGeom>
-        </p:spPr>
-        <p:txBody>
-          <a:bodyPr spcFirstLastPara="1" vert="horz" wrap="square" lIns="91425" tIns="91425" rIns="91425" bIns="91425" rtlCol="0" anchor="ctr" anchorCtr="0">
-            <a:noAutofit/>
-          </a:bodyPr>
-          <a:lstStyle>
-            <a:lvl1pPr marL="0" indent="0" algn="ctr" defTabSz="914400" rtl="0" eaLnBrk="1" latinLnBrk="0" hangingPunct="1">
-              <a:lnSpc>
-                <a:spcPct val="90000"/>
-              </a:lnSpc>
-              <a:spcBef>
-                <a:spcPts val="1000"/>
-              </a:spcBef>
-              <a:buFont typeface="Arial" panose="020B0604020202020204" pitchFamily="34" charset="0"/>
-              <a:buNone/>
-              <a:defRPr sz="2400" kern="1200">
-                <a:solidFill>
-                  <a:schemeClr val="tx1"/>
-                </a:solidFill>
-                <a:latin typeface="+mn-lt"/>
-                <a:ea typeface="+mn-ea"/>
-                <a:cs typeface="+mn-cs"/>
-              </a:defRPr>
-            </a:lvl1pPr>
-            <a:lvl2pPr marL="457200" indent="0" algn="ctr" defTabSz="914400" rtl="0" eaLnBrk="1" latinLnBrk="0" hangingPunct="1">
-              <a:lnSpc>
-                <a:spcPct val="90000"/>
-              </a:lnSpc>
-              <a:spcBef>
-                <a:spcPts val="500"/>
-              </a:spcBef>
-              <a:buFont typeface="Arial" panose="020B0604020202020204" pitchFamily="34" charset="0"/>
-              <a:buNone/>
-              <a:defRPr sz="2000" kern="1200">
-                <a:solidFill>
-                  <a:schemeClr val="tx1"/>
-                </a:solidFill>
-                <a:latin typeface="+mn-lt"/>
-                <a:ea typeface="+mn-ea"/>
-                <a:cs typeface="+mn-cs"/>
-              </a:defRPr>
-            </a:lvl2pPr>
-            <a:lvl3pPr marL="914400" indent="0" algn="ctr" defTabSz="914400" rtl="0" eaLnBrk="1" latinLnBrk="0" hangingPunct="1">
-              <a:lnSpc>
-                <a:spcPct val="90000"/>
-              </a:lnSpc>
-              <a:spcBef>
-                <a:spcPts val="500"/>
-              </a:spcBef>
-              <a:buFont typeface="Arial" panose="020B0604020202020204" pitchFamily="34" charset="0"/>
-              <a:buNone/>
-              <a:defRPr sz="1800" kern="1200">
-                <a:solidFill>
-                  <a:schemeClr val="tx1"/>
-                </a:solidFill>
-                <a:latin typeface="+mn-lt"/>
-                <a:ea typeface="+mn-ea"/>
-                <a:cs typeface="+mn-cs"/>
-              </a:defRPr>
-            </a:lvl3pPr>
-            <a:lvl4pPr marL="1371600" indent="0" algn="ctr" defTabSz="914400" rtl="0" eaLnBrk="1" latinLnBrk="0" hangingPunct="1">
-              <a:lnSpc>
-                <a:spcPct val="90000"/>
-              </a:lnSpc>
-              <a:spcBef>
-                <a:spcPts val="500"/>
-              </a:spcBef>
-              <a:buFont typeface="Arial" panose="020B0604020202020204" pitchFamily="34" charset="0"/>
-              <a:buNone/>
-              <a:defRPr sz="1600" kern="1200">
-                <a:solidFill>
-                  <a:schemeClr val="tx1"/>
-                </a:solidFill>
-                <a:latin typeface="+mn-lt"/>
-                <a:ea typeface="+mn-ea"/>
-                <a:cs typeface="+mn-cs"/>
-              </a:defRPr>
-            </a:lvl4pPr>
-            <a:lvl5pPr marL="1828800" indent="0" algn="ctr" defTabSz="914400" rtl="0" eaLnBrk="1" latinLnBrk="0" hangingPunct="1">
-              <a:lnSpc>
-                <a:spcPct val="90000"/>
-              </a:lnSpc>
-              <a:spcBef>
-                <a:spcPts val="500"/>
-              </a:spcBef>
-              <a:buFont typeface="Arial" panose="020B0604020202020204" pitchFamily="34" charset="0"/>
-              <a:buNone/>
-              <a:defRPr sz="1600" kern="1200">
-                <a:solidFill>
-                  <a:schemeClr val="tx1"/>
-                </a:solidFill>
-                <a:latin typeface="+mn-lt"/>
-                <a:ea typeface="+mn-ea"/>
-                <a:cs typeface="+mn-cs"/>
-              </a:defRPr>
-            </a:lvl5pPr>
-            <a:lvl6pPr marL="2286000" indent="0" algn="ctr" defTabSz="914400" rtl="0" eaLnBrk="1" latinLnBrk="0" hangingPunct="1">
-              <a:lnSpc>
-                <a:spcPct val="90000"/>
-              </a:lnSpc>
-              <a:spcBef>
-                <a:spcPts val="500"/>
-              </a:spcBef>
-              <a:buFont typeface="Arial" panose="020B0604020202020204" pitchFamily="34" charset="0"/>
-              <a:buNone/>
-              <a:defRPr sz="1600" kern="1200">
-                <a:solidFill>
-                  <a:schemeClr val="tx1"/>
-                </a:solidFill>
-                <a:latin typeface="+mn-lt"/>
-                <a:ea typeface="+mn-ea"/>
-                <a:cs typeface="+mn-cs"/>
-              </a:defRPr>
-            </a:lvl6pPr>
-            <a:lvl7pPr marL="2743200" indent="0" algn="ctr" defTabSz="914400" rtl="0" eaLnBrk="1" latinLnBrk="0" hangingPunct="1">
-              <a:lnSpc>
-                <a:spcPct val="90000"/>
-              </a:lnSpc>
-              <a:spcBef>
-                <a:spcPts val="500"/>
-              </a:spcBef>
-              <a:buFont typeface="Arial" panose="020B0604020202020204" pitchFamily="34" charset="0"/>
-              <a:buNone/>
-              <a:defRPr sz="1600" kern="1200">
-                <a:solidFill>
-                  <a:schemeClr val="tx1"/>
-                </a:solidFill>
-                <a:latin typeface="+mn-lt"/>
-                <a:ea typeface="+mn-ea"/>
-                <a:cs typeface="+mn-cs"/>
-              </a:defRPr>
-            </a:lvl7pPr>
-            <a:lvl8pPr marL="3200400" indent="0" algn="ctr" defTabSz="914400" rtl="0" eaLnBrk="1" latinLnBrk="0" hangingPunct="1">
-              <a:lnSpc>
-                <a:spcPct val="90000"/>
-              </a:lnSpc>
-              <a:spcBef>
-                <a:spcPts val="500"/>
-              </a:spcBef>
-              <a:buFont typeface="Arial" panose="020B0604020202020204" pitchFamily="34" charset="0"/>
-              <a:buNone/>
-              <a:defRPr sz="1600" kern="1200">
-                <a:solidFill>
-                  <a:schemeClr val="tx1"/>
-                </a:solidFill>
-                <a:latin typeface="+mn-lt"/>
-                <a:ea typeface="+mn-ea"/>
-                <a:cs typeface="+mn-cs"/>
-              </a:defRPr>
-            </a:lvl8pPr>
-            <a:lvl9pPr marL="3657600" indent="0" algn="ctr" defTabSz="914400" rtl="0" eaLnBrk="1" latinLnBrk="0" hangingPunct="1">
-              <a:lnSpc>
-                <a:spcPct val="90000"/>
-              </a:lnSpc>
-              <a:spcBef>
-                <a:spcPts val="500"/>
-              </a:spcBef>
-              <a:buFont typeface="Arial" panose="020B0604020202020204" pitchFamily="34" charset="0"/>
-              <a:buNone/>
-              <a:defRPr sz="1600" kern="1200">
-                <a:solidFill>
-                  <a:schemeClr val="tx1"/>
-                </a:solidFill>
-                <a:latin typeface="+mn-lt"/>
-                <a:ea typeface="+mn-ea"/>
-                <a:cs typeface="+mn-cs"/>
-              </a:defRPr>
-            </a:lvl9pPr>
-          </a:lstStyle>
-          <a:p>
-            <a:pPr>
-              <a:spcBef>
-                <a:spcPts val="0"/>
-              </a:spcBef>
-              <a:buClr>
-                <a:schemeClr val="dk1"/>
-              </a:buClr>
-              <a:buSzPts val="1100"/>
-            </a:pPr>
-            <a:r>
-              <a:rPr lang="pt-BR" sz="4000" b="1" dirty="0">
-                <a:solidFill>
-                  <a:srgbClr val="073763"/>
-                </a:solidFill>
-                <a:latin typeface="Century Gothic" panose="020B0502020202020204" pitchFamily="34" charset="0"/>
-                <a:ea typeface="Proxima Nova"/>
-                <a:cs typeface="Proxima Nova"/>
-                <a:sym typeface="Proxima Nova"/>
-              </a:rPr>
-              <a:t>&gt;_Evitar muitos ‘</a:t>
-            </a:r>
-            <a:r>
-              <a:rPr lang="pt-BR" sz="4000" b="1" dirty="0" err="1">
-                <a:solidFill>
-                  <a:srgbClr val="073763"/>
-                </a:solidFill>
-                <a:latin typeface="Century Gothic" panose="020B0502020202020204" pitchFamily="34" charset="0"/>
-                <a:ea typeface="Proxima Nova"/>
-                <a:cs typeface="Proxima Nova"/>
-                <a:sym typeface="Proxima Nova"/>
-              </a:rPr>
-              <a:t>if’s</a:t>
-            </a:r>
-            <a:r>
-              <a:rPr lang="pt-BR" sz="4000" b="1" dirty="0">
-                <a:solidFill>
-                  <a:srgbClr val="073763"/>
-                </a:solidFill>
-                <a:latin typeface="Century Gothic" panose="020B0502020202020204" pitchFamily="34" charset="0"/>
-                <a:ea typeface="Proxima Nova"/>
-                <a:cs typeface="Proxima Nova"/>
-                <a:sym typeface="Proxima Nova"/>
-              </a:rPr>
-              <a:t> e </a:t>
-            </a:r>
-          </a:p>
-          <a:p>
-            <a:pPr>
-              <a:spcBef>
-                <a:spcPts val="0"/>
-              </a:spcBef>
-              <a:buClr>
-                <a:schemeClr val="dk1"/>
-              </a:buClr>
-              <a:buSzPts val="1100"/>
-            </a:pPr>
-            <a:r>
-              <a:rPr lang="pt-BR" sz="4000" b="1" dirty="0">
-                <a:solidFill>
-                  <a:srgbClr val="073763"/>
-                </a:solidFill>
-                <a:latin typeface="Century Gothic" panose="020B0502020202020204" pitchFamily="34" charset="0"/>
-                <a:ea typeface="Proxima Nova"/>
-                <a:cs typeface="Proxima Nova"/>
-                <a:sym typeface="Proxima Nova"/>
-              </a:rPr>
-              <a:t>parametrizações</a:t>
-            </a:r>
-          </a:p>
-        </p:txBody>
-      </p:sp>
-      <p:grpSp>
-        <p:nvGrpSpPr>
-          <p:cNvPr id="12" name="Agrupar 11">
-            <a:extLst>
-              <a:ext uri="{FF2B5EF4-FFF2-40B4-BE49-F238E27FC236}">
-                <a16:creationId xmlns:a16="http://schemas.microsoft.com/office/drawing/2014/main" id="{42FD3A37-40ED-6247-86D1-E141807BA118}"/>
-              </a:ext>
-            </a:extLst>
-          </p:cNvPr>
-          <p:cNvGrpSpPr/>
-          <p:nvPr/>
-        </p:nvGrpSpPr>
-        <p:grpSpPr>
-          <a:xfrm>
-            <a:off x="415600" y="2411418"/>
-            <a:ext cx="3568285" cy="2408664"/>
-            <a:chOff x="415600" y="2411418"/>
-            <a:chExt cx="3568285" cy="2408664"/>
-          </a:xfrm>
-        </p:grpSpPr>
-        <p:pic>
-          <p:nvPicPr>
-            <p:cNvPr id="11" name="Imagem 10">
-              <a:extLst>
-                <a:ext uri="{FF2B5EF4-FFF2-40B4-BE49-F238E27FC236}">
-                  <a16:creationId xmlns:a16="http://schemas.microsoft.com/office/drawing/2014/main" id="{AC51C07A-AD8B-E04A-AECF-1C82F670FEA1}"/>
-                </a:ext>
-              </a:extLst>
-            </p:cNvPr>
-            <p:cNvPicPr>
-              <a:picLocks noChangeAspect="1"/>
-            </p:cNvPicPr>
-            <p:nvPr/>
-          </p:nvPicPr>
-          <p:blipFill>
-            <a:blip r:embed="rId2"/>
-            <a:stretch>
-              <a:fillRect/>
-            </a:stretch>
-          </p:blipFill>
-          <p:spPr>
-            <a:xfrm>
-              <a:off x="415600" y="2689897"/>
-              <a:ext cx="3568285" cy="2130185"/>
-            </a:xfrm>
-            <a:prstGeom prst="rect">
-              <a:avLst/>
-            </a:prstGeom>
-          </p:spPr>
-        </p:pic>
-        <p:sp>
-          <p:nvSpPr>
-            <p:cNvPr id="13" name="Retângulo Arredondado 12">
-              <a:extLst>
-                <a:ext uri="{FF2B5EF4-FFF2-40B4-BE49-F238E27FC236}">
-                  <a16:creationId xmlns:a16="http://schemas.microsoft.com/office/drawing/2014/main" id="{C85F978A-0D28-2545-B5EE-265B2196798B}"/>
-                </a:ext>
-              </a:extLst>
-            </p:cNvPr>
-            <p:cNvSpPr/>
-            <p:nvPr/>
-          </p:nvSpPr>
-          <p:spPr>
-            <a:xfrm>
-              <a:off x="415600" y="2411418"/>
-              <a:ext cx="1359854" cy="568270"/>
-            </a:xfrm>
-            <a:prstGeom prst="roundRect">
-              <a:avLst/>
-            </a:prstGeom>
-            <a:solidFill>
-              <a:schemeClr val="accent1">
-                <a:lumMod val="40000"/>
-                <a:lumOff val="60000"/>
-              </a:schemeClr>
-            </a:solidFill>
-          </p:spPr>
-          <p:style>
-            <a:lnRef idx="2">
-              <a:schemeClr val="accent1">
-                <a:shade val="50000"/>
-              </a:schemeClr>
-            </a:lnRef>
-            <a:fillRef idx="1">
-              <a:schemeClr val="accent1"/>
-            </a:fillRef>
-            <a:effectRef idx="0">
-              <a:schemeClr val="accent1"/>
-            </a:effectRef>
-            <a:fontRef idx="minor">
-              <a:schemeClr val="lt1"/>
-            </a:fontRef>
-          </p:style>
-          <p:txBody>
-            <a:bodyPr rtlCol="0" anchor="ctr"/>
-            <a:lstStyle/>
-            <a:p>
-              <a:pPr algn="ctr"/>
-              <a:r>
-                <a:rPr lang="pt-BR" sz="1200" dirty="0">
-                  <a:solidFill>
-                    <a:schemeClr val="tx1"/>
-                  </a:solidFill>
-                </a:rPr>
-                <a:t>Componente</a:t>
-              </a:r>
-            </a:p>
-          </p:txBody>
-        </p:sp>
-      </p:grpSp>
-      <p:grpSp>
-        <p:nvGrpSpPr>
-          <p:cNvPr id="45" name="Agrupar 44">
-            <a:extLst>
-              <a:ext uri="{FF2B5EF4-FFF2-40B4-BE49-F238E27FC236}">
-                <a16:creationId xmlns:a16="http://schemas.microsoft.com/office/drawing/2014/main" id="{2D46B4A7-59EE-AF40-8301-1D6173531135}"/>
-              </a:ext>
-            </a:extLst>
-          </p:cNvPr>
-          <p:cNvGrpSpPr/>
-          <p:nvPr/>
-        </p:nvGrpSpPr>
-        <p:grpSpPr>
-          <a:xfrm>
-            <a:off x="4583575" y="1653336"/>
-            <a:ext cx="6077194" cy="4827338"/>
-            <a:chOff x="4583575" y="1653336"/>
-            <a:chExt cx="6077194" cy="4827338"/>
-          </a:xfrm>
-        </p:grpSpPr>
-        <p:cxnSp>
-          <p:nvCxnSpPr>
-            <p:cNvPr id="48" name="Conector de Seta Reta 47">
-              <a:extLst>
-                <a:ext uri="{FF2B5EF4-FFF2-40B4-BE49-F238E27FC236}">
-                  <a16:creationId xmlns:a16="http://schemas.microsoft.com/office/drawing/2014/main" id="{BDD40DB7-3A81-8741-9456-387972A040F9}"/>
-                </a:ext>
-              </a:extLst>
-            </p:cNvPr>
-            <p:cNvCxnSpPr>
-              <a:cxnSpLocks/>
-            </p:cNvCxnSpPr>
-            <p:nvPr/>
-          </p:nvCxnSpPr>
-          <p:spPr>
-            <a:xfrm>
-              <a:off x="4583575" y="3761770"/>
-              <a:ext cx="1666754" cy="0"/>
-            </a:xfrm>
-            <a:prstGeom prst="straightConnector1">
-              <a:avLst/>
-            </a:prstGeom>
-            <a:ln>
-              <a:tailEnd type="triangle"/>
-            </a:ln>
-          </p:spPr>
-          <p:style>
-            <a:lnRef idx="1">
-              <a:schemeClr val="dk1"/>
-            </a:lnRef>
-            <a:fillRef idx="0">
-              <a:schemeClr val="dk1"/>
-            </a:fillRef>
-            <a:effectRef idx="0">
-              <a:schemeClr val="dk1"/>
-            </a:effectRef>
-            <a:fontRef idx="minor">
-              <a:schemeClr val="tx1"/>
-            </a:fontRef>
-          </p:style>
-        </p:cxnSp>
-        <p:grpSp>
-          <p:nvGrpSpPr>
-            <p:cNvPr id="44" name="Agrupar 43">
-              <a:extLst>
-                <a:ext uri="{FF2B5EF4-FFF2-40B4-BE49-F238E27FC236}">
-                  <a16:creationId xmlns:a16="http://schemas.microsoft.com/office/drawing/2014/main" id="{7ACA0D0B-D11A-494F-92C2-FAF8E5723CB0}"/>
-                </a:ext>
-              </a:extLst>
-            </p:cNvPr>
-            <p:cNvGrpSpPr/>
-            <p:nvPr/>
-          </p:nvGrpSpPr>
-          <p:grpSpPr>
-            <a:xfrm>
-              <a:off x="6862031" y="3322025"/>
-              <a:ext cx="3798738" cy="1499504"/>
-              <a:chOff x="6862031" y="3393739"/>
-              <a:chExt cx="3798738" cy="1499504"/>
-            </a:xfrm>
-          </p:grpSpPr>
-          <p:pic>
-            <p:nvPicPr>
-              <p:cNvPr id="17" name="Imagem 16">
-                <a:extLst>
-                  <a:ext uri="{FF2B5EF4-FFF2-40B4-BE49-F238E27FC236}">
-                    <a16:creationId xmlns:a16="http://schemas.microsoft.com/office/drawing/2014/main" id="{05A018C3-B7A0-994F-8B47-91DE46A933E3}"/>
-                  </a:ext>
-                </a:extLst>
-              </p:cNvPr>
-              <p:cNvPicPr>
-                <a:picLocks noChangeAspect="1"/>
-              </p:cNvPicPr>
-              <p:nvPr/>
-            </p:nvPicPr>
-            <p:blipFill>
-              <a:blip r:embed="rId3"/>
-              <a:stretch>
-                <a:fillRect/>
-              </a:stretch>
-            </p:blipFill>
-            <p:spPr>
-              <a:xfrm>
-                <a:off x="6862031" y="3674961"/>
-                <a:ext cx="3798738" cy="1218282"/>
-              </a:xfrm>
-              <a:prstGeom prst="rect">
-                <a:avLst/>
-              </a:prstGeom>
-            </p:spPr>
-          </p:pic>
-          <p:sp>
-            <p:nvSpPr>
-              <p:cNvPr id="35" name="Retângulo Arredondado 34">
-                <a:extLst>
-                  <a:ext uri="{FF2B5EF4-FFF2-40B4-BE49-F238E27FC236}">
-                    <a16:creationId xmlns:a16="http://schemas.microsoft.com/office/drawing/2014/main" id="{E96EA729-03F3-874F-86C0-ABFF3426F398}"/>
-                  </a:ext>
-                </a:extLst>
-              </p:cNvPr>
-              <p:cNvSpPr/>
-              <p:nvPr/>
-            </p:nvSpPr>
-            <p:spPr>
-              <a:xfrm>
-                <a:off x="6862032" y="3393739"/>
-                <a:ext cx="1359854" cy="568270"/>
-              </a:xfrm>
-              <a:prstGeom prst="roundRect">
-                <a:avLst/>
-              </a:prstGeom>
-              <a:solidFill>
-                <a:schemeClr val="accent1">
-                  <a:lumMod val="40000"/>
-                  <a:lumOff val="60000"/>
-                </a:schemeClr>
-              </a:solidFill>
-            </p:spPr>
-            <p:style>
-              <a:lnRef idx="2">
-                <a:schemeClr val="accent1">
-                  <a:shade val="50000"/>
-                </a:schemeClr>
-              </a:lnRef>
-              <a:fillRef idx="1">
-                <a:schemeClr val="accent1"/>
-              </a:fillRef>
-              <a:effectRef idx="0">
-                <a:schemeClr val="accent1"/>
-              </a:effectRef>
-              <a:fontRef idx="minor">
-                <a:schemeClr val="lt1"/>
-              </a:fontRef>
-            </p:style>
-            <p:txBody>
-              <a:bodyPr rtlCol="0" anchor="ctr"/>
-              <a:lstStyle/>
-              <a:p>
-                <a:pPr algn="ctr"/>
-                <a:r>
-                  <a:rPr lang="pt-BR" sz="1200" dirty="0">
-                    <a:solidFill>
-                      <a:schemeClr val="tx1"/>
-                    </a:solidFill>
-                  </a:rPr>
-                  <a:t>Componente </a:t>
-                </a:r>
-                <a:r>
-                  <a:rPr lang="pt-BR" sz="1200" dirty="0" err="1">
-                    <a:solidFill>
-                      <a:schemeClr val="tx1"/>
-                    </a:solidFill>
-                  </a:rPr>
-                  <a:t>B</a:t>
-                </a:r>
-                <a:endParaRPr lang="pt-BR" sz="1200" dirty="0">
-                  <a:solidFill>
-                    <a:schemeClr val="tx1"/>
-                  </a:solidFill>
-                </a:endParaRPr>
-              </a:p>
-            </p:txBody>
-          </p:sp>
-        </p:grpSp>
-        <p:grpSp>
-          <p:nvGrpSpPr>
-            <p:cNvPr id="23" name="Agrupar 22">
-              <a:extLst>
-                <a:ext uri="{FF2B5EF4-FFF2-40B4-BE49-F238E27FC236}">
-                  <a16:creationId xmlns:a16="http://schemas.microsoft.com/office/drawing/2014/main" id="{1512FE3B-7EF5-6C41-89C3-56F82F896C34}"/>
-                </a:ext>
-              </a:extLst>
-            </p:cNvPr>
-            <p:cNvGrpSpPr/>
-            <p:nvPr/>
-          </p:nvGrpSpPr>
-          <p:grpSpPr>
-            <a:xfrm>
-              <a:off x="6850457" y="4983668"/>
-              <a:ext cx="3720404" cy="1497006"/>
-              <a:chOff x="6850457" y="4925793"/>
-              <a:chExt cx="3720404" cy="1497006"/>
-            </a:xfrm>
-          </p:grpSpPr>
-          <p:pic>
-            <p:nvPicPr>
-              <p:cNvPr id="22" name="Imagem 21">
-                <a:extLst>
-                  <a:ext uri="{FF2B5EF4-FFF2-40B4-BE49-F238E27FC236}">
-                    <a16:creationId xmlns:a16="http://schemas.microsoft.com/office/drawing/2014/main" id="{CB76DEED-DD7D-E545-ADC2-440262BB7BCE}"/>
-                  </a:ext>
-                </a:extLst>
-              </p:cNvPr>
-              <p:cNvPicPr>
-                <a:picLocks noChangeAspect="1"/>
-              </p:cNvPicPr>
-              <p:nvPr/>
-            </p:nvPicPr>
-            <p:blipFill>
-              <a:blip r:embed="rId4"/>
-              <a:stretch>
-                <a:fillRect/>
-              </a:stretch>
-            </p:blipFill>
-            <p:spPr>
-              <a:xfrm>
-                <a:off x="6854902" y="5209233"/>
-                <a:ext cx="3715959" cy="1213566"/>
-              </a:xfrm>
-              <a:prstGeom prst="rect">
-                <a:avLst/>
-              </a:prstGeom>
-            </p:spPr>
-          </p:pic>
-          <p:sp>
-            <p:nvSpPr>
-              <p:cNvPr id="42" name="Retângulo Arredondado 41">
-                <a:extLst>
-                  <a:ext uri="{FF2B5EF4-FFF2-40B4-BE49-F238E27FC236}">
-                    <a16:creationId xmlns:a16="http://schemas.microsoft.com/office/drawing/2014/main" id="{D7E468C3-4B47-3540-A55B-66934BAAD616}"/>
-                  </a:ext>
-                </a:extLst>
-              </p:cNvPr>
-              <p:cNvSpPr/>
-              <p:nvPr/>
-            </p:nvSpPr>
-            <p:spPr>
-              <a:xfrm>
-                <a:off x="6850457" y="4925793"/>
-                <a:ext cx="1359854" cy="568270"/>
-              </a:xfrm>
-              <a:prstGeom prst="roundRect">
-                <a:avLst/>
-              </a:prstGeom>
-              <a:solidFill>
-                <a:schemeClr val="accent1">
-                  <a:lumMod val="40000"/>
-                  <a:lumOff val="60000"/>
-                </a:schemeClr>
-              </a:solidFill>
-            </p:spPr>
-            <p:style>
-              <a:lnRef idx="2">
-                <a:schemeClr val="accent1">
-                  <a:shade val="50000"/>
-                </a:schemeClr>
-              </a:lnRef>
-              <a:fillRef idx="1">
-                <a:schemeClr val="accent1"/>
-              </a:fillRef>
-              <a:effectRef idx="0">
-                <a:schemeClr val="accent1"/>
-              </a:effectRef>
-              <a:fontRef idx="minor">
-                <a:schemeClr val="lt1"/>
-              </a:fontRef>
-            </p:style>
-            <p:txBody>
-              <a:bodyPr rtlCol="0" anchor="ctr"/>
-              <a:lstStyle/>
-              <a:p>
-                <a:pPr algn="ctr"/>
-                <a:r>
-                  <a:rPr lang="pt-BR" sz="1200" dirty="0">
-                    <a:solidFill>
-                      <a:schemeClr val="tx1"/>
-                    </a:solidFill>
-                  </a:rPr>
-                  <a:t>Componente C</a:t>
-                </a:r>
-              </a:p>
-            </p:txBody>
-          </p:sp>
-        </p:grpSp>
-        <p:grpSp>
-          <p:nvGrpSpPr>
-            <p:cNvPr id="20" name="Agrupar 19">
-              <a:extLst>
-                <a:ext uri="{FF2B5EF4-FFF2-40B4-BE49-F238E27FC236}">
-                  <a16:creationId xmlns:a16="http://schemas.microsoft.com/office/drawing/2014/main" id="{49E8159A-E8ED-2B47-B099-EE38277AAFD2}"/>
-                </a:ext>
-              </a:extLst>
-            </p:cNvPr>
-            <p:cNvGrpSpPr/>
-            <p:nvPr/>
-          </p:nvGrpSpPr>
-          <p:grpSpPr>
-            <a:xfrm>
-              <a:off x="6862031" y="1653336"/>
-              <a:ext cx="3701703" cy="1506551"/>
-              <a:chOff x="6862031" y="1734360"/>
-              <a:chExt cx="3701703" cy="1506551"/>
-            </a:xfrm>
-          </p:grpSpPr>
-          <p:pic>
-            <p:nvPicPr>
-              <p:cNvPr id="15" name="Imagem 14">
-                <a:extLst>
-                  <a:ext uri="{FF2B5EF4-FFF2-40B4-BE49-F238E27FC236}">
-                    <a16:creationId xmlns:a16="http://schemas.microsoft.com/office/drawing/2014/main" id="{6D39291D-6D8C-9843-BE4E-BD2CAB532035}"/>
-                  </a:ext>
-                </a:extLst>
-              </p:cNvPr>
-              <p:cNvPicPr>
-                <a:picLocks noChangeAspect="1"/>
-              </p:cNvPicPr>
-              <p:nvPr/>
-            </p:nvPicPr>
-            <p:blipFill>
-              <a:blip r:embed="rId5"/>
-              <a:stretch>
-                <a:fillRect/>
-              </a:stretch>
-            </p:blipFill>
-            <p:spPr>
-              <a:xfrm>
-                <a:off x="6862031" y="2022629"/>
-                <a:ext cx="3701703" cy="1218282"/>
-              </a:xfrm>
-              <a:prstGeom prst="rect">
-                <a:avLst/>
-              </a:prstGeom>
-            </p:spPr>
-          </p:pic>
-          <p:sp>
-            <p:nvSpPr>
-              <p:cNvPr id="46" name="Retângulo Arredondado 45">
-                <a:extLst>
-                  <a:ext uri="{FF2B5EF4-FFF2-40B4-BE49-F238E27FC236}">
-                    <a16:creationId xmlns:a16="http://schemas.microsoft.com/office/drawing/2014/main" id="{BD6EF4CC-3C0C-C64D-B8AF-A0F5435509D4}"/>
-                  </a:ext>
-                </a:extLst>
-              </p:cNvPr>
-              <p:cNvSpPr/>
-              <p:nvPr/>
-            </p:nvSpPr>
-            <p:spPr>
-              <a:xfrm>
-                <a:off x="6862032" y="1734360"/>
-                <a:ext cx="1359854" cy="568270"/>
-              </a:xfrm>
-              <a:prstGeom prst="roundRect">
-                <a:avLst/>
-              </a:prstGeom>
-              <a:solidFill>
-                <a:schemeClr val="accent1">
-                  <a:lumMod val="40000"/>
-                  <a:lumOff val="60000"/>
-                </a:schemeClr>
-              </a:solidFill>
-            </p:spPr>
-            <p:style>
-              <a:lnRef idx="2">
-                <a:schemeClr val="accent1">
-                  <a:shade val="50000"/>
-                </a:schemeClr>
-              </a:lnRef>
-              <a:fillRef idx="1">
-                <a:schemeClr val="accent1"/>
-              </a:fillRef>
-              <a:effectRef idx="0">
-                <a:schemeClr val="accent1"/>
-              </a:effectRef>
-              <a:fontRef idx="minor">
-                <a:schemeClr val="lt1"/>
-              </a:fontRef>
-            </p:style>
-            <p:txBody>
-              <a:bodyPr rtlCol="0" anchor="ctr"/>
-              <a:lstStyle/>
-              <a:p>
-                <a:pPr algn="ctr"/>
-                <a:r>
-                  <a:rPr lang="pt-BR" sz="1200" dirty="0">
-                    <a:solidFill>
-                      <a:schemeClr val="tx1"/>
-                    </a:solidFill>
-                  </a:rPr>
-                  <a:t>Componente A</a:t>
-                </a:r>
-              </a:p>
-            </p:txBody>
-          </p:sp>
-        </p:grpSp>
-      </p:grpSp>
-    </p:spTree>
-    <p:extLst>
-      <p:ext uri="{BB962C8B-B14F-4D97-AF65-F5344CB8AC3E}">
-        <p14:creationId xmlns:p14="http://schemas.microsoft.com/office/powerpoint/2010/main" val="3346528745"/>
-      </p:ext>
-    </p:extLst>
-  </p:cSld>
-  <p:clrMapOvr>
-    <a:masterClrMapping/>
-  </p:clrMapOvr>
-  <mc:AlternateContent xmlns:mc="http://schemas.openxmlformats.org/markup-compatibility/2006" xmlns:p14="http://schemas.microsoft.com/office/powerpoint/2010/main">
-    <mc:Choice Requires="p14">
-      <p:transition spd="med" p14:dur="700">
-        <p:fade/>
-      </p:transition>
-    </mc:Choice>
-    <mc:Fallback xmlns="">
-      <p:transition spd="med">
-        <p:fade/>
-      </p:transition>
-    </mc:Fallback>
-  </mc:AlternateContent>
-  <p:timing>
-    <p:tnLst>
-      <p:par>
-        <p:cTn id="1" dur="indefinite" restart="never" nodeType="tmRoot">
-          <p:childTnLst>
-            <p:seq concurrent="1" nextAc="seek">
-              <p:cTn id="2" dur="indefinite" nodeType="mainSeq">
-                <p:childTnLst>
-                  <p:par>
-                    <p:cTn id="3" fill="hold">
-                      <p:stCondLst>
-                        <p:cond delay="indefinite"/>
-                      </p:stCondLst>
-                      <p:childTnLst>
-                        <p:par>
-                          <p:cTn id="4" fill="hold">
-                            <p:stCondLst>
-                              <p:cond delay="0"/>
-                            </p:stCondLst>
-                            <p:childTnLst>
-                              <p:par>
-                                <p:cTn id="5" presetID="22" presetClass="entr" presetSubtype="8" fill="hold" nodeType="clickEffect">
-                                  <p:stCondLst>
-                                    <p:cond delay="0"/>
-                                  </p:stCondLst>
-                                  <p:childTnLst>
-                                    <p:set>
-                                      <p:cBhvr>
-                                        <p:cTn id="6" dur="1" fill="hold">
-                                          <p:stCondLst>
-                                            <p:cond delay="0"/>
-                                          </p:stCondLst>
-                                        </p:cTn>
-                                        <p:tgtEl>
-                                          <p:spTgt spid="45"/>
-                                        </p:tgtEl>
-                                        <p:attrNameLst>
-                                          <p:attrName>style.visibility</p:attrName>
-                                        </p:attrNameLst>
-                                      </p:cBhvr>
-                                      <p:to>
-                                        <p:strVal val="visible"/>
-                                      </p:to>
-                                    </p:set>
-                                    <p:animEffect transition="in" filter="wipe(left)">
-                                      <p:cBhvr>
-                                        <p:cTn id="7" dur="500"/>
-                                        <p:tgtEl>
-                                          <p:spTgt spid="45"/>
-                                        </p:tgtEl>
-                                      </p:cBhvr>
-                                    </p:animEffect>
-                                  </p:childTnLst>
-                                </p:cTn>
-                              </p:par>
-                            </p:childTnLst>
-                          </p:cTn>
-                        </p:par>
-                      </p:childTnLst>
-                    </p:cTn>
-                  </p:par>
-                </p:childTnLst>
-              </p:cTn>
-              <p:prevCondLst>
-                <p:cond evt="onPrev" delay="0">
-                  <p:tgtEl>
-                    <p:sldTgt/>
-                  </p:tgtEl>
-                </p:cond>
-              </p:prevCondLst>
-              <p:nextCondLst>
-                <p:cond evt="onNext" delay="0">
-                  <p:tgtEl>
-                    <p:sldTgt/>
-                  </p:tgtEl>
-                </p:cond>
-              </p:nextCondLst>
-            </p:seq>
-          </p:childTnLst>
-        </p:cTn>
-      </p:par>
-    </p:tnLst>
-  </p:timing>
-</p:sld>
-</file>
-
-<file path=ppt/slides/slide28.xml><?xml version="1.0" encoding="utf-8"?>
+<file path=ppt/slides/slide25.xml><?xml version="1.0" encoding="utf-8"?>
 <p:sld xmlns:a="http://schemas.openxmlformats.org/drawingml/2006/main" xmlns:r="http://schemas.openxmlformats.org/officeDocument/2006/relationships" xmlns:p="http://schemas.openxmlformats.org/presentationml/2006/main">
   <p:cSld>
     <p:spTree>
@@ -26951,7 +23076,7 @@
 </p:sld>
 </file>
 
-<file path=ppt/slides/slide29.xml><?xml version="1.0" encoding="utf-8"?>
+<file path=ppt/slides/slide26.xml><?xml version="1.0" encoding="utf-8"?>
 <p:sld xmlns:a="http://schemas.openxmlformats.org/drawingml/2006/main" xmlns:r="http://schemas.openxmlformats.org/officeDocument/2006/relationships" xmlns:p="http://schemas.openxmlformats.org/presentationml/2006/main">
   <p:cSld>
     <p:spTree>

</xml_diff>